<commit_message>
docs: adicionar o modelo de negocio base
</commit_message>
<xml_diff>
--- a/Sprint 1 - Entregavel do Projeto - v2 - Aluno.pptx
+++ b/Sprint 1 - Entregavel do Projeto - v2 - Aluno.pptx
@@ -158,172 +158,6 @@
 
 <file path=ppt/changesInfos/changesInfo1.xml><?xml version="1.0" encoding="utf-8"?>
 <pc:chgInfo xmlns:a="http://schemas.openxmlformats.org/drawingml/2006/main" xmlns:r="http://schemas.openxmlformats.org/officeDocument/2006/relationships" xmlns:ac="http://schemas.microsoft.com/office/drawing/2013/main/command" xmlns:pc="http://schemas.microsoft.com/office/powerpoint/2013/main/command">
-  <pc:docChgLst>
-    <pc:chgData name="Gerson Santos" userId="6c4494c9-e300-475e-8570-19c96c3d8172" providerId="ADAL" clId="{28FCD676-A402-47E8-9C32-C9A6D9909E94}"/>
-    <pc:docChg chg="custSel addSld delSld modSld">
-      <pc:chgData name="Gerson Santos" userId="6c4494c9-e300-475e-8570-19c96c3d8172" providerId="ADAL" clId="{28FCD676-A402-47E8-9C32-C9A6D9909E94}" dt="2021-08-10T17:56:39.444" v="186" actId="6549"/>
-      <pc:docMkLst>
-        <pc:docMk/>
-      </pc:docMkLst>
-      <pc:sldChg chg="del">
-        <pc:chgData name="Gerson Santos" userId="6c4494c9-e300-475e-8570-19c96c3d8172" providerId="ADAL" clId="{28FCD676-A402-47E8-9C32-C9A6D9909E94}" dt="2021-08-10T17:53:04.883" v="1" actId="47"/>
-        <pc:sldMkLst>
-          <pc:docMk/>
-          <pc:sldMk cId="2415085052" sldId="593"/>
-        </pc:sldMkLst>
-      </pc:sldChg>
-      <pc:sldChg chg="delSp modSp mod">
-        <pc:chgData name="Gerson Santos" userId="6c4494c9-e300-475e-8570-19c96c3d8172" providerId="ADAL" clId="{28FCD676-A402-47E8-9C32-C9A6D9909E94}" dt="2021-08-10T17:54:02.377" v="108" actId="1036"/>
-        <pc:sldMkLst>
-          <pc:docMk/>
-          <pc:sldMk cId="1010721534" sldId="600"/>
-        </pc:sldMkLst>
-        <pc:spChg chg="mod">
-          <ac:chgData name="Gerson Santos" userId="6c4494c9-e300-475e-8570-19c96c3d8172" providerId="ADAL" clId="{28FCD676-A402-47E8-9C32-C9A6D9909E94}" dt="2021-08-10T17:54:02.377" v="108" actId="1036"/>
-          <ac:spMkLst>
-            <pc:docMk/>
-            <pc:sldMk cId="1010721534" sldId="600"/>
-            <ac:spMk id="32" creationId="{057FCB7D-5B0A-4D23-AEF9-7F2AA1E30C76}"/>
-          </ac:spMkLst>
-        </pc:spChg>
-        <pc:spChg chg="mod">
-          <ac:chgData name="Gerson Santos" userId="6c4494c9-e300-475e-8570-19c96c3d8172" providerId="ADAL" clId="{28FCD676-A402-47E8-9C32-C9A6D9909E94}" dt="2021-08-10T17:54:02.377" v="108" actId="1036"/>
-          <ac:spMkLst>
-            <pc:docMk/>
-            <pc:sldMk cId="1010721534" sldId="600"/>
-            <ac:spMk id="34" creationId="{65DFBC55-8446-4393-8E00-5D2F0A377509}"/>
-          </ac:spMkLst>
-        </pc:spChg>
-        <pc:spChg chg="del">
-          <ac:chgData name="Gerson Santos" userId="6c4494c9-e300-475e-8570-19c96c3d8172" providerId="ADAL" clId="{28FCD676-A402-47E8-9C32-C9A6D9909E94}" dt="2021-08-10T17:53:33.445" v="5" actId="478"/>
-          <ac:spMkLst>
-            <pc:docMk/>
-            <pc:sldMk cId="1010721534" sldId="600"/>
-            <ac:spMk id="36" creationId="{5988A0C7-9A9A-45F9-B41F-429C2C02D082}"/>
-          </ac:spMkLst>
-        </pc:spChg>
-        <pc:spChg chg="mod">
-          <ac:chgData name="Gerson Santos" userId="6c4494c9-e300-475e-8570-19c96c3d8172" providerId="ADAL" clId="{28FCD676-A402-47E8-9C32-C9A6D9909E94}" dt="2021-08-10T17:53:48.233" v="55" actId="1035"/>
-          <ac:spMkLst>
-            <pc:docMk/>
-            <pc:sldMk cId="1010721534" sldId="600"/>
-            <ac:spMk id="50" creationId="{9A498E02-A53D-43C5-8A8C-E911C378ACFE}"/>
-          </ac:spMkLst>
-        </pc:spChg>
-        <pc:spChg chg="mod">
-          <ac:chgData name="Gerson Santos" userId="6c4494c9-e300-475e-8570-19c96c3d8172" providerId="ADAL" clId="{28FCD676-A402-47E8-9C32-C9A6D9909E94}" dt="2021-08-10T17:53:48.233" v="55" actId="1035"/>
-          <ac:spMkLst>
-            <pc:docMk/>
-            <pc:sldMk cId="1010721534" sldId="600"/>
-            <ac:spMk id="51" creationId="{C8A70B33-92D8-4986-AA19-E48CE787D15D}"/>
-          </ac:spMkLst>
-        </pc:spChg>
-        <pc:picChg chg="del">
-          <ac:chgData name="Gerson Santos" userId="6c4494c9-e300-475e-8570-19c96c3d8172" providerId="ADAL" clId="{28FCD676-A402-47E8-9C32-C9A6D9909E94}" dt="2021-08-10T17:53:34.315" v="6" actId="478"/>
-          <ac:picMkLst>
-            <pc:docMk/>
-            <pc:sldMk cId="1010721534" sldId="600"/>
-            <ac:picMk id="43" creationId="{69FAC983-C7FF-41C6-9EB6-E6E0B97E47CB}"/>
-          </ac:picMkLst>
-        </pc:picChg>
-        <pc:cxnChg chg="mod">
-          <ac:chgData name="Gerson Santos" userId="6c4494c9-e300-475e-8570-19c96c3d8172" providerId="ADAL" clId="{28FCD676-A402-47E8-9C32-C9A6D9909E94}" dt="2021-08-10T17:53:56.069" v="90" actId="1035"/>
-          <ac:cxnSpMkLst>
-            <pc:docMk/>
-            <pc:sldMk cId="1010721534" sldId="600"/>
-            <ac:cxnSpMk id="33" creationId="{9D1FDD8A-6877-49FB-A4A9-32172D6FE06F}"/>
-          </ac:cxnSpMkLst>
-        </pc:cxnChg>
-        <pc:cxnChg chg="del">
-          <ac:chgData name="Gerson Santos" userId="6c4494c9-e300-475e-8570-19c96c3d8172" providerId="ADAL" clId="{28FCD676-A402-47E8-9C32-C9A6D9909E94}" dt="2021-08-10T17:53:39.365" v="7" actId="478"/>
-          <ac:cxnSpMkLst>
-            <pc:docMk/>
-            <pc:sldMk cId="1010721534" sldId="600"/>
-            <ac:cxnSpMk id="37" creationId="{465783DE-DC9B-4E81-A205-39F651C9CE0E}"/>
-          </ac:cxnSpMkLst>
-        </pc:cxnChg>
-      </pc:sldChg>
-      <pc:sldChg chg="modSp mod modAnim">
-        <pc:chgData name="Gerson Santos" userId="6c4494c9-e300-475e-8570-19c96c3d8172" providerId="ADAL" clId="{28FCD676-A402-47E8-9C32-C9A6D9909E94}" dt="2021-08-10T17:56:39.444" v="186" actId="6549"/>
-        <pc:sldMkLst>
-          <pc:docMk/>
-          <pc:sldMk cId="2820918408" sldId="616"/>
-        </pc:sldMkLst>
-        <pc:spChg chg="mod">
-          <ac:chgData name="Gerson Santos" userId="6c4494c9-e300-475e-8570-19c96c3d8172" providerId="ADAL" clId="{28FCD676-A402-47E8-9C32-C9A6D9909E94}" dt="2021-08-10T17:56:39.444" v="186" actId="6549"/>
-          <ac:spMkLst>
-            <pc:docMk/>
-            <pc:sldMk cId="2820918408" sldId="616"/>
-            <ac:spMk id="2" creationId="{00000000-0000-0000-0000-000000000000}"/>
-          </ac:spMkLst>
-        </pc:spChg>
-        <pc:spChg chg="mod">
-          <ac:chgData name="Gerson Santos" userId="6c4494c9-e300-475e-8570-19c96c3d8172" providerId="ADAL" clId="{28FCD676-A402-47E8-9C32-C9A6D9909E94}" dt="2021-08-10T17:56:17.775" v="125" actId="20577"/>
-          <ac:spMkLst>
-            <pc:docMk/>
-            <pc:sldMk cId="2820918408" sldId="616"/>
-            <ac:spMk id="4" creationId="{00000000-0000-0000-0000-000000000000}"/>
-          </ac:spMkLst>
-        </pc:spChg>
-      </pc:sldChg>
-      <pc:sldChg chg="del">
-        <pc:chgData name="Gerson Santos" userId="6c4494c9-e300-475e-8570-19c96c3d8172" providerId="ADAL" clId="{28FCD676-A402-47E8-9C32-C9A6D9909E94}" dt="2021-08-10T17:53:08.570" v="2" actId="47"/>
-        <pc:sldMkLst>
-          <pc:docMk/>
-          <pc:sldMk cId="3128149770" sldId="617"/>
-        </pc:sldMkLst>
-      </pc:sldChg>
-      <pc:sldChg chg="del">
-        <pc:chgData name="Gerson Santos" userId="6c4494c9-e300-475e-8570-19c96c3d8172" providerId="ADAL" clId="{28FCD676-A402-47E8-9C32-C9A6D9909E94}" dt="2021-08-10T17:53:23.988" v="3" actId="47"/>
-        <pc:sldMkLst>
-          <pc:docMk/>
-          <pc:sldMk cId="2844713583" sldId="618"/>
-        </pc:sldMkLst>
-      </pc:sldChg>
-      <pc:sldChg chg="del">
-        <pc:chgData name="Gerson Santos" userId="6c4494c9-e300-475e-8570-19c96c3d8172" providerId="ADAL" clId="{28FCD676-A402-47E8-9C32-C9A6D9909E94}" dt="2021-08-10T17:53:23.988" v="3" actId="47"/>
-        <pc:sldMkLst>
-          <pc:docMk/>
-          <pc:sldMk cId="3275046269" sldId="619"/>
-        </pc:sldMkLst>
-      </pc:sldChg>
-      <pc:sldChg chg="del">
-        <pc:chgData name="Gerson Santos" userId="6c4494c9-e300-475e-8570-19c96c3d8172" providerId="ADAL" clId="{28FCD676-A402-47E8-9C32-C9A6D9909E94}" dt="2021-08-10T17:53:23.988" v="3" actId="47"/>
-        <pc:sldMkLst>
-          <pc:docMk/>
-          <pc:sldMk cId="2283835195" sldId="621"/>
-        </pc:sldMkLst>
-      </pc:sldChg>
-      <pc:sldChg chg="del">
-        <pc:chgData name="Gerson Santos" userId="6c4494c9-e300-475e-8570-19c96c3d8172" providerId="ADAL" clId="{28FCD676-A402-47E8-9C32-C9A6D9909E94}" dt="2021-08-10T17:53:23.988" v="3" actId="47"/>
-        <pc:sldMkLst>
-          <pc:docMk/>
-          <pc:sldMk cId="1359739959" sldId="628"/>
-        </pc:sldMkLst>
-      </pc:sldChg>
-      <pc:sldChg chg="del">
-        <pc:chgData name="Gerson Santos" userId="6c4494c9-e300-475e-8570-19c96c3d8172" providerId="ADAL" clId="{28FCD676-A402-47E8-9C32-C9A6D9909E94}" dt="2021-08-10T17:53:26.660" v="4" actId="47"/>
-        <pc:sldMkLst>
-          <pc:docMk/>
-          <pc:sldMk cId="4144405345" sldId="629"/>
-        </pc:sldMkLst>
-      </pc:sldChg>
-      <pc:sldChg chg="add">
-        <pc:chgData name="Gerson Santos" userId="6c4494c9-e300-475e-8570-19c96c3d8172" providerId="ADAL" clId="{28FCD676-A402-47E8-9C32-C9A6D9909E94}" dt="2021-08-10T17:56:10.858" v="109"/>
-        <pc:sldMkLst>
-          <pc:docMk/>
-          <pc:sldMk cId="433866970" sldId="634"/>
-        </pc:sldMkLst>
-      </pc:sldChg>
-      <pc:sldChg chg="del">
-        <pc:chgData name="Gerson Santos" userId="6c4494c9-e300-475e-8570-19c96c3d8172" providerId="ADAL" clId="{28FCD676-A402-47E8-9C32-C9A6D9909E94}" dt="2021-08-10T17:53:01.918" v="0" actId="47"/>
-        <pc:sldMkLst>
-          <pc:docMk/>
-          <pc:sldMk cId="673390320" sldId="898"/>
-        </pc:sldMkLst>
-      </pc:sldChg>
-    </pc:docChg>
-  </pc:docChgLst>
   <pc:docChgLst>
     <pc:chgData name="Gerson" userId="6c4494c9-e300-475e-8570-19c96c3d8172" providerId="ADAL" clId="{31AD0EF7-A346-477D-86F2-A1D5AE438D28}"/>
     <pc:docChg chg="undo custSel addSld delSld modSld sldOrd delMainMaster">
@@ -1416,6 +1250,592 @@
     </pc:docChg>
   </pc:docChgLst>
   <pc:docChgLst>
+    <pc:chgData name="Gerson" userId="6c4494c9-e300-475e-8570-19c96c3d8172" providerId="ADAL" clId="{57F47F72-D214-4805-8B11-427FD8416EE3}"/>
+    <pc:docChg chg="custSel addSld delSld modSld sldOrd">
+      <pc:chgData name="Gerson" userId="6c4494c9-e300-475e-8570-19c96c3d8172" providerId="ADAL" clId="{57F47F72-D214-4805-8B11-427FD8416EE3}" dt="2021-02-18T17:29:10.467" v="434" actId="47"/>
+      <pc:docMkLst>
+        <pc:docMk/>
+      </pc:docMkLst>
+      <pc:sldChg chg="modSp mod">
+        <pc:chgData name="Gerson" userId="6c4494c9-e300-475e-8570-19c96c3d8172" providerId="ADAL" clId="{57F47F72-D214-4805-8B11-427FD8416EE3}" dt="2021-02-18T14:20:18.747" v="82" actId="20577"/>
+        <pc:sldMkLst>
+          <pc:docMk/>
+          <pc:sldMk cId="1091756452" sldId="291"/>
+        </pc:sldMkLst>
+        <pc:spChg chg="mod">
+          <ac:chgData name="Gerson" userId="6c4494c9-e300-475e-8570-19c96c3d8172" providerId="ADAL" clId="{57F47F72-D214-4805-8B11-427FD8416EE3}" dt="2021-02-18T14:20:18.747" v="82" actId="20577"/>
+          <ac:spMkLst>
+            <pc:docMk/>
+            <pc:sldMk cId="1091756452" sldId="291"/>
+            <ac:spMk id="13" creationId="{00000000-0000-0000-0000-000000000000}"/>
+          </ac:spMkLst>
+        </pc:spChg>
+      </pc:sldChg>
+      <pc:sldChg chg="ord">
+        <pc:chgData name="Gerson" userId="6c4494c9-e300-475e-8570-19c96c3d8172" providerId="ADAL" clId="{57F47F72-D214-4805-8B11-427FD8416EE3}" dt="2021-02-18T17:28:38.330" v="429"/>
+        <pc:sldMkLst>
+          <pc:docMk/>
+          <pc:sldMk cId="2415085052" sldId="593"/>
+        </pc:sldMkLst>
+      </pc:sldChg>
+      <pc:sldChg chg="modSp mod">
+        <pc:chgData name="Gerson" userId="6c4494c9-e300-475e-8570-19c96c3d8172" providerId="ADAL" clId="{57F47F72-D214-4805-8B11-427FD8416EE3}" dt="2021-02-18T14:19:02.441" v="18" actId="403"/>
+        <pc:sldMkLst>
+          <pc:docMk/>
+          <pc:sldMk cId="2177177731" sldId="599"/>
+        </pc:sldMkLst>
+        <pc:spChg chg="mod">
+          <ac:chgData name="Gerson" userId="6c4494c9-e300-475e-8570-19c96c3d8172" providerId="ADAL" clId="{57F47F72-D214-4805-8B11-427FD8416EE3}" dt="2021-02-18T14:19:02.441" v="18" actId="403"/>
+          <ac:spMkLst>
+            <pc:docMk/>
+            <pc:sldMk cId="2177177731" sldId="599"/>
+            <ac:spMk id="2" creationId="{00000000-0000-0000-0000-000000000000}"/>
+          </ac:spMkLst>
+        </pc:spChg>
+      </pc:sldChg>
+      <pc:sldChg chg="modSp modAnim">
+        <pc:chgData name="Gerson" userId="6c4494c9-e300-475e-8570-19c96c3d8172" providerId="ADAL" clId="{57F47F72-D214-4805-8B11-427FD8416EE3}" dt="2021-02-18T17:02:18.314" v="423" actId="6549"/>
+        <pc:sldMkLst>
+          <pc:docMk/>
+          <pc:sldMk cId="1398324226" sldId="601"/>
+        </pc:sldMkLst>
+        <pc:spChg chg="mod">
+          <ac:chgData name="Gerson" userId="6c4494c9-e300-475e-8570-19c96c3d8172" providerId="ADAL" clId="{57F47F72-D214-4805-8B11-427FD8416EE3}" dt="2021-02-18T17:02:18.314" v="423" actId="6549"/>
+          <ac:spMkLst>
+            <pc:docMk/>
+            <pc:sldMk cId="1398324226" sldId="601"/>
+            <ac:spMk id="2" creationId="{00000000-0000-0000-0000-000000000000}"/>
+          </ac:spMkLst>
+        </pc:spChg>
+      </pc:sldChg>
+      <pc:sldChg chg="del">
+        <pc:chgData name="Gerson" userId="6c4494c9-e300-475e-8570-19c96c3d8172" providerId="ADAL" clId="{57F47F72-D214-4805-8B11-427FD8416EE3}" dt="2021-02-18T14:24:15.745" v="411" actId="47"/>
+        <pc:sldMkLst>
+          <pc:docMk/>
+          <pc:sldMk cId="801199801" sldId="603"/>
+        </pc:sldMkLst>
+      </pc:sldChg>
+      <pc:sldChg chg="del">
+        <pc:chgData name="Gerson" userId="6c4494c9-e300-475e-8570-19c96c3d8172" providerId="ADAL" clId="{57F47F72-D214-4805-8B11-427FD8416EE3}" dt="2021-02-18T14:24:13.277" v="410" actId="47"/>
+        <pc:sldMkLst>
+          <pc:docMk/>
+          <pc:sldMk cId="2938640072" sldId="604"/>
+        </pc:sldMkLst>
+      </pc:sldChg>
+      <pc:sldChg chg="modSp del mod ord">
+        <pc:chgData name="Gerson" userId="6c4494c9-e300-475e-8570-19c96c3d8172" providerId="ADAL" clId="{57F47F72-D214-4805-8B11-427FD8416EE3}" dt="2021-02-18T17:29:10.467" v="434" actId="47"/>
+        <pc:sldMkLst>
+          <pc:docMk/>
+          <pc:sldMk cId="4114683031" sldId="615"/>
+        </pc:sldMkLst>
+        <pc:spChg chg="mod">
+          <ac:chgData name="Gerson" userId="6c4494c9-e300-475e-8570-19c96c3d8172" providerId="ADAL" clId="{57F47F72-D214-4805-8B11-427FD8416EE3}" dt="2021-02-18T14:23:54.928" v="409" actId="6549"/>
+          <ac:spMkLst>
+            <pc:docMk/>
+            <pc:sldMk cId="4114683031" sldId="615"/>
+            <ac:spMk id="6" creationId="{FA09424E-04A1-461B-B173-B1448D152853}"/>
+          </ac:spMkLst>
+        </pc:spChg>
+      </pc:sldChg>
+      <pc:sldChg chg="modSp add del modAnim">
+        <pc:chgData name="Gerson" userId="6c4494c9-e300-475e-8570-19c96c3d8172" providerId="ADAL" clId="{57F47F72-D214-4805-8B11-427FD8416EE3}" dt="2021-02-18T17:28:27.765" v="426"/>
+        <pc:sldMkLst>
+          <pc:docMk/>
+          <pc:sldMk cId="2820918408" sldId="616"/>
+        </pc:sldMkLst>
+        <pc:spChg chg="mod">
+          <ac:chgData name="Gerson" userId="6c4494c9-e300-475e-8570-19c96c3d8172" providerId="ADAL" clId="{57F47F72-D214-4805-8B11-427FD8416EE3}" dt="2021-02-18T14:19:36.729" v="59" actId="20577"/>
+          <ac:spMkLst>
+            <pc:docMk/>
+            <pc:sldMk cId="2820918408" sldId="616"/>
+            <ac:spMk id="2" creationId="{00000000-0000-0000-0000-000000000000}"/>
+          </ac:spMkLst>
+        </pc:spChg>
+      </pc:sldChg>
+      <pc:sldChg chg="modSp del mod">
+        <pc:chgData name="Gerson" userId="6c4494c9-e300-475e-8570-19c96c3d8172" providerId="ADAL" clId="{57F47F72-D214-4805-8B11-427FD8416EE3}" dt="2021-02-18T17:28:51.256" v="431" actId="47"/>
+        <pc:sldMkLst>
+          <pc:docMk/>
+          <pc:sldMk cId="747581455" sldId="620"/>
+        </pc:sldMkLst>
+        <pc:spChg chg="mod">
+          <ac:chgData name="Gerson" userId="6c4494c9-e300-475e-8570-19c96c3d8172" providerId="ADAL" clId="{57F47F72-D214-4805-8B11-427FD8416EE3}" dt="2021-02-18T14:21:32.988" v="150" actId="20577"/>
+          <ac:spMkLst>
+            <pc:docMk/>
+            <pc:sldMk cId="747581455" sldId="620"/>
+            <ac:spMk id="4" creationId="{00000000-0000-0000-0000-000000000000}"/>
+          </ac:spMkLst>
+        </pc:spChg>
+        <pc:spChg chg="mod">
+          <ac:chgData name="Gerson" userId="6c4494c9-e300-475e-8570-19c96c3d8172" providerId="ADAL" clId="{57F47F72-D214-4805-8B11-427FD8416EE3}" dt="2021-02-18T17:02:35.309" v="424" actId="1076"/>
+          <ac:spMkLst>
+            <pc:docMk/>
+            <pc:sldMk cId="747581455" sldId="620"/>
+            <ac:spMk id="8" creationId="{7996320F-8012-42D5-A8E9-DDE68A5940E9}"/>
+          </ac:spMkLst>
+        </pc:spChg>
+      </pc:sldChg>
+      <pc:sldChg chg="modSp add del mod">
+        <pc:chgData name="Gerson" userId="6c4494c9-e300-475e-8570-19c96c3d8172" providerId="ADAL" clId="{57F47F72-D214-4805-8B11-427FD8416EE3}" dt="2021-02-18T17:29:09.500" v="433" actId="47"/>
+        <pc:sldMkLst>
+          <pc:docMk/>
+          <pc:sldMk cId="1446799968" sldId="622"/>
+        </pc:sldMkLst>
+        <pc:spChg chg="mod">
+          <ac:chgData name="Gerson" userId="6c4494c9-e300-475e-8570-19c96c3d8172" providerId="ADAL" clId="{57F47F72-D214-4805-8B11-427FD8416EE3}" dt="2021-02-18T14:22:44.065" v="264" actId="20577"/>
+          <ac:spMkLst>
+            <pc:docMk/>
+            <pc:sldMk cId="1446799968" sldId="622"/>
+            <ac:spMk id="4" creationId="{00000000-0000-0000-0000-000000000000}"/>
+          </ac:spMkLst>
+        </pc:spChg>
+        <pc:spChg chg="mod">
+          <ac:chgData name="Gerson" userId="6c4494c9-e300-475e-8570-19c96c3d8172" providerId="ADAL" clId="{57F47F72-D214-4805-8B11-427FD8416EE3}" dt="2021-02-18T14:23:17.488" v="349" actId="20577"/>
+          <ac:spMkLst>
+            <pc:docMk/>
+            <pc:sldMk cId="1446799968" sldId="622"/>
+            <ac:spMk id="6" creationId="{FA09424E-04A1-461B-B173-B1448D152853}"/>
+          </ac:spMkLst>
+        </pc:spChg>
+      </pc:sldChg>
+      <pc:sldChg chg="modSp add del mod">
+        <pc:chgData name="Gerson" userId="6c4494c9-e300-475e-8570-19c96c3d8172" providerId="ADAL" clId="{57F47F72-D214-4805-8B11-427FD8416EE3}" dt="2021-02-18T14:23:42.353" v="383" actId="47"/>
+        <pc:sldMkLst>
+          <pc:docMk/>
+          <pc:sldMk cId="492763629" sldId="623"/>
+        </pc:sldMkLst>
+        <pc:spChg chg="mod">
+          <ac:chgData name="Gerson" userId="6c4494c9-e300-475e-8570-19c96c3d8172" providerId="ADAL" clId="{57F47F72-D214-4805-8B11-427FD8416EE3}" dt="2021-02-18T14:23:29.011" v="380" actId="20577"/>
+          <ac:spMkLst>
+            <pc:docMk/>
+            <pc:sldMk cId="492763629" sldId="623"/>
+            <ac:spMk id="6" creationId="{FA09424E-04A1-461B-B173-B1448D152853}"/>
+          </ac:spMkLst>
+        </pc:spChg>
+      </pc:sldChg>
+      <pc:sldChg chg="add">
+        <pc:chgData name="Gerson" userId="6c4494c9-e300-475e-8570-19c96c3d8172" providerId="ADAL" clId="{57F47F72-D214-4805-8B11-427FD8416EE3}" dt="2021-02-18T17:28:32.060" v="427"/>
+        <pc:sldMkLst>
+          <pc:docMk/>
+          <pc:sldMk cId="2114404914" sldId="623"/>
+        </pc:sldMkLst>
+      </pc:sldChg>
+      <pc:sldChg chg="add">
+        <pc:chgData name="Gerson" userId="6c4494c9-e300-475e-8570-19c96c3d8172" providerId="ADAL" clId="{57F47F72-D214-4805-8B11-427FD8416EE3}" dt="2021-02-18T17:28:27.765" v="426"/>
+        <pc:sldMkLst>
+          <pc:docMk/>
+          <pc:sldMk cId="2328458479" sldId="624"/>
+        </pc:sldMkLst>
+      </pc:sldChg>
+      <pc:sldChg chg="add">
+        <pc:chgData name="Gerson" userId="6c4494c9-e300-475e-8570-19c96c3d8172" providerId="ADAL" clId="{57F47F72-D214-4805-8B11-427FD8416EE3}" dt="2021-02-18T17:28:49.674" v="430"/>
+        <pc:sldMkLst>
+          <pc:docMk/>
+          <pc:sldMk cId="1173506212" sldId="625"/>
+        </pc:sldMkLst>
+      </pc:sldChg>
+      <pc:sldChg chg="add">
+        <pc:chgData name="Gerson" userId="6c4494c9-e300-475e-8570-19c96c3d8172" providerId="ADAL" clId="{57F47F72-D214-4805-8B11-427FD8416EE3}" dt="2021-02-18T17:29:06.498" v="432"/>
+        <pc:sldMkLst>
+          <pc:docMk/>
+          <pc:sldMk cId="1915638063" sldId="626"/>
+        </pc:sldMkLst>
+      </pc:sldChg>
+      <pc:sldChg chg="add">
+        <pc:chgData name="Gerson" userId="6c4494c9-e300-475e-8570-19c96c3d8172" providerId="ADAL" clId="{57F47F72-D214-4805-8B11-427FD8416EE3}" dt="2021-02-18T17:29:06.498" v="432"/>
+        <pc:sldMkLst>
+          <pc:docMk/>
+          <pc:sldMk cId="2847436393" sldId="627"/>
+        </pc:sldMkLst>
+      </pc:sldChg>
+    </pc:docChg>
+  </pc:docChgLst>
+  <pc:docChgLst>
+    <pc:chgData name="Gerson Santos" userId="6c4494c9-e300-475e-8570-19c96c3d8172" providerId="ADAL" clId="{28FCD676-A402-47E8-9C32-C9A6D9909E94}"/>
+    <pc:docChg chg="custSel addSld delSld modSld">
+      <pc:chgData name="Gerson Santos" userId="6c4494c9-e300-475e-8570-19c96c3d8172" providerId="ADAL" clId="{28FCD676-A402-47E8-9C32-C9A6D9909E94}" dt="2021-08-10T17:56:39.444" v="186" actId="6549"/>
+      <pc:docMkLst>
+        <pc:docMk/>
+      </pc:docMkLst>
+      <pc:sldChg chg="del">
+        <pc:chgData name="Gerson Santos" userId="6c4494c9-e300-475e-8570-19c96c3d8172" providerId="ADAL" clId="{28FCD676-A402-47E8-9C32-C9A6D9909E94}" dt="2021-08-10T17:53:04.883" v="1" actId="47"/>
+        <pc:sldMkLst>
+          <pc:docMk/>
+          <pc:sldMk cId="2415085052" sldId="593"/>
+        </pc:sldMkLst>
+      </pc:sldChg>
+      <pc:sldChg chg="delSp modSp mod">
+        <pc:chgData name="Gerson Santos" userId="6c4494c9-e300-475e-8570-19c96c3d8172" providerId="ADAL" clId="{28FCD676-A402-47E8-9C32-C9A6D9909E94}" dt="2021-08-10T17:54:02.377" v="108" actId="1036"/>
+        <pc:sldMkLst>
+          <pc:docMk/>
+          <pc:sldMk cId="1010721534" sldId="600"/>
+        </pc:sldMkLst>
+        <pc:spChg chg="mod">
+          <ac:chgData name="Gerson Santos" userId="6c4494c9-e300-475e-8570-19c96c3d8172" providerId="ADAL" clId="{28FCD676-A402-47E8-9C32-C9A6D9909E94}" dt="2021-08-10T17:54:02.377" v="108" actId="1036"/>
+          <ac:spMkLst>
+            <pc:docMk/>
+            <pc:sldMk cId="1010721534" sldId="600"/>
+            <ac:spMk id="32" creationId="{057FCB7D-5B0A-4D23-AEF9-7F2AA1E30C76}"/>
+          </ac:spMkLst>
+        </pc:spChg>
+        <pc:spChg chg="mod">
+          <ac:chgData name="Gerson Santos" userId="6c4494c9-e300-475e-8570-19c96c3d8172" providerId="ADAL" clId="{28FCD676-A402-47E8-9C32-C9A6D9909E94}" dt="2021-08-10T17:54:02.377" v="108" actId="1036"/>
+          <ac:spMkLst>
+            <pc:docMk/>
+            <pc:sldMk cId="1010721534" sldId="600"/>
+            <ac:spMk id="34" creationId="{65DFBC55-8446-4393-8E00-5D2F0A377509}"/>
+          </ac:spMkLst>
+        </pc:spChg>
+        <pc:spChg chg="del">
+          <ac:chgData name="Gerson Santos" userId="6c4494c9-e300-475e-8570-19c96c3d8172" providerId="ADAL" clId="{28FCD676-A402-47E8-9C32-C9A6D9909E94}" dt="2021-08-10T17:53:33.445" v="5" actId="478"/>
+          <ac:spMkLst>
+            <pc:docMk/>
+            <pc:sldMk cId="1010721534" sldId="600"/>
+            <ac:spMk id="36" creationId="{5988A0C7-9A9A-45F9-B41F-429C2C02D082}"/>
+          </ac:spMkLst>
+        </pc:spChg>
+        <pc:spChg chg="mod">
+          <ac:chgData name="Gerson Santos" userId="6c4494c9-e300-475e-8570-19c96c3d8172" providerId="ADAL" clId="{28FCD676-A402-47E8-9C32-C9A6D9909E94}" dt="2021-08-10T17:53:48.233" v="55" actId="1035"/>
+          <ac:spMkLst>
+            <pc:docMk/>
+            <pc:sldMk cId="1010721534" sldId="600"/>
+            <ac:spMk id="50" creationId="{9A498E02-A53D-43C5-8A8C-E911C378ACFE}"/>
+          </ac:spMkLst>
+        </pc:spChg>
+        <pc:spChg chg="mod">
+          <ac:chgData name="Gerson Santos" userId="6c4494c9-e300-475e-8570-19c96c3d8172" providerId="ADAL" clId="{28FCD676-A402-47E8-9C32-C9A6D9909E94}" dt="2021-08-10T17:53:48.233" v="55" actId="1035"/>
+          <ac:spMkLst>
+            <pc:docMk/>
+            <pc:sldMk cId="1010721534" sldId="600"/>
+            <ac:spMk id="51" creationId="{C8A70B33-92D8-4986-AA19-E48CE787D15D}"/>
+          </ac:spMkLst>
+        </pc:spChg>
+        <pc:picChg chg="del">
+          <ac:chgData name="Gerson Santos" userId="6c4494c9-e300-475e-8570-19c96c3d8172" providerId="ADAL" clId="{28FCD676-A402-47E8-9C32-C9A6D9909E94}" dt="2021-08-10T17:53:34.315" v="6" actId="478"/>
+          <ac:picMkLst>
+            <pc:docMk/>
+            <pc:sldMk cId="1010721534" sldId="600"/>
+            <ac:picMk id="43" creationId="{69FAC983-C7FF-41C6-9EB6-E6E0B97E47CB}"/>
+          </ac:picMkLst>
+        </pc:picChg>
+        <pc:cxnChg chg="mod">
+          <ac:chgData name="Gerson Santos" userId="6c4494c9-e300-475e-8570-19c96c3d8172" providerId="ADAL" clId="{28FCD676-A402-47E8-9C32-C9A6D9909E94}" dt="2021-08-10T17:53:56.069" v="90" actId="1035"/>
+          <ac:cxnSpMkLst>
+            <pc:docMk/>
+            <pc:sldMk cId="1010721534" sldId="600"/>
+            <ac:cxnSpMk id="33" creationId="{9D1FDD8A-6877-49FB-A4A9-32172D6FE06F}"/>
+          </ac:cxnSpMkLst>
+        </pc:cxnChg>
+        <pc:cxnChg chg="del">
+          <ac:chgData name="Gerson Santos" userId="6c4494c9-e300-475e-8570-19c96c3d8172" providerId="ADAL" clId="{28FCD676-A402-47E8-9C32-C9A6D9909E94}" dt="2021-08-10T17:53:39.365" v="7" actId="478"/>
+          <ac:cxnSpMkLst>
+            <pc:docMk/>
+            <pc:sldMk cId="1010721534" sldId="600"/>
+            <ac:cxnSpMk id="37" creationId="{465783DE-DC9B-4E81-A205-39F651C9CE0E}"/>
+          </ac:cxnSpMkLst>
+        </pc:cxnChg>
+      </pc:sldChg>
+      <pc:sldChg chg="modSp mod modAnim">
+        <pc:chgData name="Gerson Santos" userId="6c4494c9-e300-475e-8570-19c96c3d8172" providerId="ADAL" clId="{28FCD676-A402-47E8-9C32-C9A6D9909E94}" dt="2021-08-10T17:56:39.444" v="186" actId="6549"/>
+        <pc:sldMkLst>
+          <pc:docMk/>
+          <pc:sldMk cId="2820918408" sldId="616"/>
+        </pc:sldMkLst>
+        <pc:spChg chg="mod">
+          <ac:chgData name="Gerson Santos" userId="6c4494c9-e300-475e-8570-19c96c3d8172" providerId="ADAL" clId="{28FCD676-A402-47E8-9C32-C9A6D9909E94}" dt="2021-08-10T17:56:39.444" v="186" actId="6549"/>
+          <ac:spMkLst>
+            <pc:docMk/>
+            <pc:sldMk cId="2820918408" sldId="616"/>
+            <ac:spMk id="2" creationId="{00000000-0000-0000-0000-000000000000}"/>
+          </ac:spMkLst>
+        </pc:spChg>
+        <pc:spChg chg="mod">
+          <ac:chgData name="Gerson Santos" userId="6c4494c9-e300-475e-8570-19c96c3d8172" providerId="ADAL" clId="{28FCD676-A402-47E8-9C32-C9A6D9909E94}" dt="2021-08-10T17:56:17.775" v="125" actId="20577"/>
+          <ac:spMkLst>
+            <pc:docMk/>
+            <pc:sldMk cId="2820918408" sldId="616"/>
+            <ac:spMk id="4" creationId="{00000000-0000-0000-0000-000000000000}"/>
+          </ac:spMkLst>
+        </pc:spChg>
+      </pc:sldChg>
+      <pc:sldChg chg="del">
+        <pc:chgData name="Gerson Santos" userId="6c4494c9-e300-475e-8570-19c96c3d8172" providerId="ADAL" clId="{28FCD676-A402-47E8-9C32-C9A6D9909E94}" dt="2021-08-10T17:53:08.570" v="2" actId="47"/>
+        <pc:sldMkLst>
+          <pc:docMk/>
+          <pc:sldMk cId="3128149770" sldId="617"/>
+        </pc:sldMkLst>
+      </pc:sldChg>
+      <pc:sldChg chg="del">
+        <pc:chgData name="Gerson Santos" userId="6c4494c9-e300-475e-8570-19c96c3d8172" providerId="ADAL" clId="{28FCD676-A402-47E8-9C32-C9A6D9909E94}" dt="2021-08-10T17:53:23.988" v="3" actId="47"/>
+        <pc:sldMkLst>
+          <pc:docMk/>
+          <pc:sldMk cId="2844713583" sldId="618"/>
+        </pc:sldMkLst>
+      </pc:sldChg>
+      <pc:sldChg chg="del">
+        <pc:chgData name="Gerson Santos" userId="6c4494c9-e300-475e-8570-19c96c3d8172" providerId="ADAL" clId="{28FCD676-A402-47E8-9C32-C9A6D9909E94}" dt="2021-08-10T17:53:23.988" v="3" actId="47"/>
+        <pc:sldMkLst>
+          <pc:docMk/>
+          <pc:sldMk cId="3275046269" sldId="619"/>
+        </pc:sldMkLst>
+      </pc:sldChg>
+      <pc:sldChg chg="del">
+        <pc:chgData name="Gerson Santos" userId="6c4494c9-e300-475e-8570-19c96c3d8172" providerId="ADAL" clId="{28FCD676-A402-47E8-9C32-C9A6D9909E94}" dt="2021-08-10T17:53:23.988" v="3" actId="47"/>
+        <pc:sldMkLst>
+          <pc:docMk/>
+          <pc:sldMk cId="2283835195" sldId="621"/>
+        </pc:sldMkLst>
+      </pc:sldChg>
+      <pc:sldChg chg="del">
+        <pc:chgData name="Gerson Santos" userId="6c4494c9-e300-475e-8570-19c96c3d8172" providerId="ADAL" clId="{28FCD676-A402-47E8-9C32-C9A6D9909E94}" dt="2021-08-10T17:53:23.988" v="3" actId="47"/>
+        <pc:sldMkLst>
+          <pc:docMk/>
+          <pc:sldMk cId="1359739959" sldId="628"/>
+        </pc:sldMkLst>
+      </pc:sldChg>
+      <pc:sldChg chg="del">
+        <pc:chgData name="Gerson Santos" userId="6c4494c9-e300-475e-8570-19c96c3d8172" providerId="ADAL" clId="{28FCD676-A402-47E8-9C32-C9A6D9909E94}" dt="2021-08-10T17:53:26.660" v="4" actId="47"/>
+        <pc:sldMkLst>
+          <pc:docMk/>
+          <pc:sldMk cId="4144405345" sldId="629"/>
+        </pc:sldMkLst>
+      </pc:sldChg>
+      <pc:sldChg chg="add">
+        <pc:chgData name="Gerson Santos" userId="6c4494c9-e300-475e-8570-19c96c3d8172" providerId="ADAL" clId="{28FCD676-A402-47E8-9C32-C9A6D9909E94}" dt="2021-08-10T17:56:10.858" v="109"/>
+        <pc:sldMkLst>
+          <pc:docMk/>
+          <pc:sldMk cId="433866970" sldId="634"/>
+        </pc:sldMkLst>
+      </pc:sldChg>
+      <pc:sldChg chg="del">
+        <pc:chgData name="Gerson Santos" userId="6c4494c9-e300-475e-8570-19c96c3d8172" providerId="ADAL" clId="{28FCD676-A402-47E8-9C32-C9A6D9909E94}" dt="2021-08-10T17:53:01.918" v="0" actId="47"/>
+        <pc:sldMkLst>
+          <pc:docMk/>
+          <pc:sldMk cId="673390320" sldId="898"/>
+        </pc:sldMkLst>
+      </pc:sldChg>
+    </pc:docChg>
+  </pc:docChgLst>
+  <pc:docChgLst>
+    <pc:chgData name="Gerson Santos" userId="6c4494c9-e300-475e-8570-19c96c3d8172" providerId="ADAL" clId="{BADD4FA8-E003-4A84-A253-C77F68F56F74}"/>
+    <pc:docChg chg="custSel addSld delSld modSld sldOrd">
+      <pc:chgData name="Gerson Santos" userId="6c4494c9-e300-475e-8570-19c96c3d8172" providerId="ADAL" clId="{BADD4FA8-E003-4A84-A253-C77F68F56F74}" dt="2021-08-10T16:53:57.329" v="354" actId="729"/>
+      <pc:docMkLst>
+        <pc:docMk/>
+      </pc:docMkLst>
+      <pc:sldChg chg="del">
+        <pc:chgData name="Gerson Santos" userId="6c4494c9-e300-475e-8570-19c96c3d8172" providerId="ADAL" clId="{BADD4FA8-E003-4A84-A253-C77F68F56F74}" dt="2021-08-10T16:29:54.021" v="73" actId="47"/>
+        <pc:sldMkLst>
+          <pc:docMk/>
+          <pc:sldMk cId="1091756452" sldId="291"/>
+        </pc:sldMkLst>
+      </pc:sldChg>
+      <pc:sldChg chg="mod modShow">
+        <pc:chgData name="Gerson Santos" userId="6c4494c9-e300-475e-8570-19c96c3d8172" providerId="ADAL" clId="{BADD4FA8-E003-4A84-A253-C77F68F56F74}" dt="2021-08-10T14:16:54.780" v="23" actId="729"/>
+        <pc:sldMkLst>
+          <pc:docMk/>
+          <pc:sldMk cId="2415085052" sldId="593"/>
+        </pc:sldMkLst>
+      </pc:sldChg>
+      <pc:sldChg chg="del">
+        <pc:chgData name="Gerson Santos" userId="6c4494c9-e300-475e-8570-19c96c3d8172" providerId="ADAL" clId="{BADD4FA8-E003-4A84-A253-C77F68F56F74}" dt="2021-08-10T14:16:07.043" v="0" actId="47"/>
+        <pc:sldMkLst>
+          <pc:docMk/>
+          <pc:sldMk cId="2177177731" sldId="599"/>
+        </pc:sldMkLst>
+      </pc:sldChg>
+      <pc:sldChg chg="modSp mod">
+        <pc:chgData name="Gerson Santos" userId="6c4494c9-e300-475e-8570-19c96c3d8172" providerId="ADAL" clId="{BADD4FA8-E003-4A84-A253-C77F68F56F74}" dt="2021-08-10T14:17:16.859" v="24" actId="1076"/>
+        <pc:sldMkLst>
+          <pc:docMk/>
+          <pc:sldMk cId="1010721534" sldId="600"/>
+        </pc:sldMkLst>
+        <pc:picChg chg="mod">
+          <ac:chgData name="Gerson Santos" userId="6c4494c9-e300-475e-8570-19c96c3d8172" providerId="ADAL" clId="{BADD4FA8-E003-4A84-A253-C77F68F56F74}" dt="2021-08-10T14:17:16.859" v="24" actId="1076"/>
+          <ac:picMkLst>
+            <pc:docMk/>
+            <pc:sldMk cId="1010721534" sldId="600"/>
+            <ac:picMk id="29" creationId="{19B3DCB4-A744-41A9-9082-4FA04F7F8229}"/>
+          </ac:picMkLst>
+        </pc:picChg>
+      </pc:sldChg>
+      <pc:sldChg chg="modSp mod">
+        <pc:chgData name="Gerson Santos" userId="6c4494c9-e300-475e-8570-19c96c3d8172" providerId="ADAL" clId="{BADD4FA8-E003-4A84-A253-C77F68F56F74}" dt="2021-08-10T14:17:55.803" v="71" actId="20577"/>
+        <pc:sldMkLst>
+          <pc:docMk/>
+          <pc:sldMk cId="83263419" sldId="607"/>
+        </pc:sldMkLst>
+        <pc:spChg chg="mod">
+          <ac:chgData name="Gerson Santos" userId="6c4494c9-e300-475e-8570-19c96c3d8172" providerId="ADAL" clId="{BADD4FA8-E003-4A84-A253-C77F68F56F74}" dt="2021-08-10T14:17:55.803" v="71" actId="20577"/>
+          <ac:spMkLst>
+            <pc:docMk/>
+            <pc:sldMk cId="83263419" sldId="607"/>
+            <ac:spMk id="2" creationId="{00000000-0000-0000-0000-000000000000}"/>
+          </ac:spMkLst>
+        </pc:spChg>
+      </pc:sldChg>
+      <pc:sldChg chg="modSp modAnim">
+        <pc:chgData name="Gerson Santos" userId="6c4494c9-e300-475e-8570-19c96c3d8172" providerId="ADAL" clId="{BADD4FA8-E003-4A84-A253-C77F68F56F74}" dt="2021-08-10T14:16:24.834" v="22" actId="20577"/>
+        <pc:sldMkLst>
+          <pc:docMk/>
+          <pc:sldMk cId="2820918408" sldId="616"/>
+        </pc:sldMkLst>
+        <pc:spChg chg="mod">
+          <ac:chgData name="Gerson Santos" userId="6c4494c9-e300-475e-8570-19c96c3d8172" providerId="ADAL" clId="{BADD4FA8-E003-4A84-A253-C77F68F56F74}" dt="2021-08-10T14:16:24.834" v="22" actId="20577"/>
+          <ac:spMkLst>
+            <pc:docMk/>
+            <pc:sldMk cId="2820918408" sldId="616"/>
+            <ac:spMk id="2" creationId="{00000000-0000-0000-0000-000000000000}"/>
+          </ac:spMkLst>
+        </pc:spChg>
+      </pc:sldChg>
+      <pc:sldChg chg="mod modShow">
+        <pc:chgData name="Gerson Santos" userId="6c4494c9-e300-475e-8570-19c96c3d8172" providerId="ADAL" clId="{BADD4FA8-E003-4A84-A253-C77F68F56F74}" dt="2021-08-10T16:45:50.187" v="270" actId="729"/>
+        <pc:sldMkLst>
+          <pc:docMk/>
+          <pc:sldMk cId="3128149770" sldId="617"/>
+        </pc:sldMkLst>
+      </pc:sldChg>
+      <pc:sldChg chg="del">
+        <pc:chgData name="Gerson Santos" userId="6c4494c9-e300-475e-8570-19c96c3d8172" providerId="ADAL" clId="{BADD4FA8-E003-4A84-A253-C77F68F56F74}" dt="2021-08-10T14:17:23.823" v="25" actId="47"/>
+        <pc:sldMkLst>
+          <pc:docMk/>
+          <pc:sldMk cId="1915638063" sldId="626"/>
+        </pc:sldMkLst>
+      </pc:sldChg>
+      <pc:sldChg chg="modSp mod ord">
+        <pc:chgData name="Gerson Santos" userId="6c4494c9-e300-475e-8570-19c96c3d8172" providerId="ADAL" clId="{BADD4FA8-E003-4A84-A253-C77F68F56F74}" dt="2021-08-10T16:46:02.132" v="272"/>
+        <pc:sldMkLst>
+          <pc:docMk/>
+          <pc:sldMk cId="2847436393" sldId="627"/>
+        </pc:sldMkLst>
+        <pc:spChg chg="mod">
+          <ac:chgData name="Gerson Santos" userId="6c4494c9-e300-475e-8570-19c96c3d8172" providerId="ADAL" clId="{BADD4FA8-E003-4A84-A253-C77F68F56F74}" dt="2021-08-10T14:17:34.764" v="59" actId="20577"/>
+          <ac:spMkLst>
+            <pc:docMk/>
+            <pc:sldMk cId="2847436393" sldId="627"/>
+            <ac:spMk id="4" creationId="{00000000-0000-0000-0000-000000000000}"/>
+          </ac:spMkLst>
+        </pc:spChg>
+        <pc:spChg chg="mod">
+          <ac:chgData name="Gerson Santos" userId="6c4494c9-e300-475e-8570-19c96c3d8172" providerId="ADAL" clId="{BADD4FA8-E003-4A84-A253-C77F68F56F74}" dt="2021-08-10T14:17:41.320" v="61" actId="20577"/>
+          <ac:spMkLst>
+            <pc:docMk/>
+            <pc:sldMk cId="2847436393" sldId="627"/>
+            <ac:spMk id="6" creationId="{FA09424E-04A1-461B-B173-B1448D152853}"/>
+          </ac:spMkLst>
+        </pc:spChg>
+      </pc:sldChg>
+      <pc:sldChg chg="add">
+        <pc:chgData name="Gerson Santos" userId="6c4494c9-e300-475e-8570-19c96c3d8172" providerId="ADAL" clId="{BADD4FA8-E003-4A84-A253-C77F68F56F74}" dt="2021-08-10T16:29:51.828" v="72"/>
+        <pc:sldMkLst>
+          <pc:docMk/>
+          <pc:sldMk cId="3232656943" sldId="630"/>
+        </pc:sldMkLst>
+      </pc:sldChg>
+      <pc:sldChg chg="add">
+        <pc:chgData name="Gerson Santos" userId="6c4494c9-e300-475e-8570-19c96c3d8172" providerId="ADAL" clId="{BADD4FA8-E003-4A84-A253-C77F68F56F74}" dt="2021-08-10T16:29:51.828" v="72"/>
+        <pc:sldMkLst>
+          <pc:docMk/>
+          <pc:sldMk cId="3231025939" sldId="631"/>
+        </pc:sldMkLst>
+      </pc:sldChg>
+      <pc:sldChg chg="delSp modSp add mod">
+        <pc:chgData name="Gerson Santos" userId="6c4494c9-e300-475e-8570-19c96c3d8172" providerId="ADAL" clId="{BADD4FA8-E003-4A84-A253-C77F68F56F74}" dt="2021-08-10T16:46:44.471" v="352" actId="20577"/>
+        <pc:sldMkLst>
+          <pc:docMk/>
+          <pc:sldMk cId="1109227438" sldId="632"/>
+        </pc:sldMkLst>
+        <pc:spChg chg="mod">
+          <ac:chgData name="Gerson Santos" userId="6c4494c9-e300-475e-8570-19c96c3d8172" providerId="ADAL" clId="{BADD4FA8-E003-4A84-A253-C77F68F56F74}" dt="2021-08-10T16:43:53.754" v="245" actId="14100"/>
+          <ac:spMkLst>
+            <pc:docMk/>
+            <pc:sldMk cId="1109227438" sldId="632"/>
+            <ac:spMk id="7" creationId="{00000000-0000-0000-0000-000000000000}"/>
+          </ac:spMkLst>
+        </pc:spChg>
+        <pc:spChg chg="del">
+          <ac:chgData name="Gerson Santos" userId="6c4494c9-e300-475e-8570-19c96c3d8172" providerId="ADAL" clId="{BADD4FA8-E003-4A84-A253-C77F68F56F74}" dt="2021-08-10T16:31:14.647" v="87" actId="478"/>
+          <ac:spMkLst>
+            <pc:docMk/>
+            <pc:sldMk cId="1109227438" sldId="632"/>
+            <ac:spMk id="8" creationId="{00000000-0000-0000-0000-000000000000}"/>
+          </ac:spMkLst>
+        </pc:spChg>
+        <pc:spChg chg="mod">
+          <ac:chgData name="Gerson Santos" userId="6c4494c9-e300-475e-8570-19c96c3d8172" providerId="ADAL" clId="{BADD4FA8-E003-4A84-A253-C77F68F56F74}" dt="2021-08-10T16:46:31.114" v="288" actId="20577"/>
+          <ac:spMkLst>
+            <pc:docMk/>
+            <pc:sldMk cId="1109227438" sldId="632"/>
+            <ac:spMk id="13" creationId="{00000000-0000-0000-0000-000000000000}"/>
+          </ac:spMkLst>
+        </pc:spChg>
+        <pc:spChg chg="mod">
+          <ac:chgData name="Gerson Santos" userId="6c4494c9-e300-475e-8570-19c96c3d8172" providerId="ADAL" clId="{BADD4FA8-E003-4A84-A253-C77F68F56F74}" dt="2021-08-10T16:46:44.471" v="352" actId="20577"/>
+          <ac:spMkLst>
+            <pc:docMk/>
+            <pc:sldMk cId="1109227438" sldId="632"/>
+            <ac:spMk id="14" creationId="{00000000-0000-0000-0000-000000000000}"/>
+          </ac:spMkLst>
+        </pc:spChg>
+        <pc:spChg chg="mod">
+          <ac:chgData name="Gerson Santos" userId="6c4494c9-e300-475e-8570-19c96c3d8172" providerId="ADAL" clId="{BADD4FA8-E003-4A84-A253-C77F68F56F74}" dt="2021-08-10T16:43:58.695" v="269" actId="1036"/>
+          <ac:spMkLst>
+            <pc:docMk/>
+            <pc:sldMk cId="1109227438" sldId="632"/>
+            <ac:spMk id="16" creationId="{00000000-0000-0000-0000-000000000000}"/>
+          </ac:spMkLst>
+        </pc:spChg>
+        <pc:spChg chg="mod">
+          <ac:chgData name="Gerson Santos" userId="6c4494c9-e300-475e-8570-19c96c3d8172" providerId="ADAL" clId="{BADD4FA8-E003-4A84-A253-C77F68F56F74}" dt="2021-08-10T16:30:12.117" v="85" actId="20577"/>
+          <ac:spMkLst>
+            <pc:docMk/>
+            <pc:sldMk cId="1109227438" sldId="632"/>
+            <ac:spMk id="18" creationId="{00000000-0000-0000-0000-000000000000}"/>
+          </ac:spMkLst>
+        </pc:spChg>
+        <pc:spChg chg="del">
+          <ac:chgData name="Gerson Santos" userId="6c4494c9-e300-475e-8570-19c96c3d8172" providerId="ADAL" clId="{BADD4FA8-E003-4A84-A253-C77F68F56F74}" dt="2021-08-10T16:31:16.911" v="88" actId="478"/>
+          <ac:spMkLst>
+            <pc:docMk/>
+            <pc:sldMk cId="1109227438" sldId="632"/>
+            <ac:spMk id="21" creationId="{00000000-0000-0000-0000-000000000000}"/>
+          </ac:spMkLst>
+        </pc:spChg>
+        <pc:spChg chg="del mod">
+          <ac:chgData name="Gerson Santos" userId="6c4494c9-e300-475e-8570-19c96c3d8172" providerId="ADAL" clId="{BADD4FA8-E003-4A84-A253-C77F68F56F74}" dt="2021-08-10T16:31:16.911" v="88" actId="478"/>
+          <ac:spMkLst>
+            <pc:docMk/>
+            <pc:sldMk cId="1109227438" sldId="632"/>
+            <ac:spMk id="22" creationId="{00000000-0000-0000-0000-000000000000}"/>
+          </ac:spMkLst>
+        </pc:spChg>
+      </pc:sldChg>
+      <pc:sldChg chg="modSp add">
+        <pc:chgData name="Gerson Santos" userId="6c4494c9-e300-475e-8570-19c96c3d8172" providerId="ADAL" clId="{BADD4FA8-E003-4A84-A253-C77F68F56F74}" dt="2021-08-10T16:31:43.978" v="90" actId="6549"/>
+        <pc:sldMkLst>
+          <pc:docMk/>
+          <pc:sldMk cId="3211788106" sldId="633"/>
+        </pc:sldMkLst>
+        <pc:spChg chg="mod">
+          <ac:chgData name="Gerson Santos" userId="6c4494c9-e300-475e-8570-19c96c3d8172" providerId="ADAL" clId="{BADD4FA8-E003-4A84-A253-C77F68F56F74}" dt="2021-08-10T16:31:43.978" v="90" actId="6549"/>
+          <ac:spMkLst>
+            <pc:docMk/>
+            <pc:sldMk cId="3211788106" sldId="633"/>
+            <ac:spMk id="2" creationId="{00000000-0000-0000-0000-000000000000}"/>
+          </ac:spMkLst>
+        </pc:spChg>
+      </pc:sldChg>
+      <pc:sldChg chg="add mod modShow">
+        <pc:chgData name="Gerson Santos" userId="6c4494c9-e300-475e-8570-19c96c3d8172" providerId="ADAL" clId="{BADD4FA8-E003-4A84-A253-C77F68F56F74}" dt="2021-08-10T16:53:57.329" v="354" actId="729"/>
+        <pc:sldMkLst>
+          <pc:docMk/>
+          <pc:sldMk cId="673390320" sldId="898"/>
+        </pc:sldMkLst>
+      </pc:sldChg>
+    </pc:docChg>
+  </pc:docChgLst>
+  <pc:docChgLst>
     <pc:chgData name="Gerson" userId="6c4494c9-e300-475e-8570-19c96c3d8172" providerId="ADAL" clId="{140322E2-B1F7-4306-9594-5712DDC913B2}"/>
     <pc:docChg chg="undo custSel addSld delSld modSld sldOrd">
       <pc:chgData name="Gerson" userId="6c4494c9-e300-475e-8570-19c96c3d8172" providerId="ADAL" clId="{140322E2-B1F7-4306-9594-5712DDC913B2}" dt="2021-03-02T21:30:31.570" v="705" actId="1076"/>
@@ -1770,426 +2190,6 @@
       </pc:sldChg>
     </pc:docChg>
   </pc:docChgLst>
-  <pc:docChgLst>
-    <pc:chgData name="Gerson" userId="6c4494c9-e300-475e-8570-19c96c3d8172" providerId="ADAL" clId="{57F47F72-D214-4805-8B11-427FD8416EE3}"/>
-    <pc:docChg chg="custSel addSld delSld modSld sldOrd">
-      <pc:chgData name="Gerson" userId="6c4494c9-e300-475e-8570-19c96c3d8172" providerId="ADAL" clId="{57F47F72-D214-4805-8B11-427FD8416EE3}" dt="2021-02-18T17:29:10.467" v="434" actId="47"/>
-      <pc:docMkLst>
-        <pc:docMk/>
-      </pc:docMkLst>
-      <pc:sldChg chg="modSp mod">
-        <pc:chgData name="Gerson" userId="6c4494c9-e300-475e-8570-19c96c3d8172" providerId="ADAL" clId="{57F47F72-D214-4805-8B11-427FD8416EE3}" dt="2021-02-18T14:20:18.747" v="82" actId="20577"/>
-        <pc:sldMkLst>
-          <pc:docMk/>
-          <pc:sldMk cId="1091756452" sldId="291"/>
-        </pc:sldMkLst>
-        <pc:spChg chg="mod">
-          <ac:chgData name="Gerson" userId="6c4494c9-e300-475e-8570-19c96c3d8172" providerId="ADAL" clId="{57F47F72-D214-4805-8B11-427FD8416EE3}" dt="2021-02-18T14:20:18.747" v="82" actId="20577"/>
-          <ac:spMkLst>
-            <pc:docMk/>
-            <pc:sldMk cId="1091756452" sldId="291"/>
-            <ac:spMk id="13" creationId="{00000000-0000-0000-0000-000000000000}"/>
-          </ac:spMkLst>
-        </pc:spChg>
-      </pc:sldChg>
-      <pc:sldChg chg="ord">
-        <pc:chgData name="Gerson" userId="6c4494c9-e300-475e-8570-19c96c3d8172" providerId="ADAL" clId="{57F47F72-D214-4805-8B11-427FD8416EE3}" dt="2021-02-18T17:28:38.330" v="429"/>
-        <pc:sldMkLst>
-          <pc:docMk/>
-          <pc:sldMk cId="2415085052" sldId="593"/>
-        </pc:sldMkLst>
-      </pc:sldChg>
-      <pc:sldChg chg="modSp mod">
-        <pc:chgData name="Gerson" userId="6c4494c9-e300-475e-8570-19c96c3d8172" providerId="ADAL" clId="{57F47F72-D214-4805-8B11-427FD8416EE3}" dt="2021-02-18T14:19:02.441" v="18" actId="403"/>
-        <pc:sldMkLst>
-          <pc:docMk/>
-          <pc:sldMk cId="2177177731" sldId="599"/>
-        </pc:sldMkLst>
-        <pc:spChg chg="mod">
-          <ac:chgData name="Gerson" userId="6c4494c9-e300-475e-8570-19c96c3d8172" providerId="ADAL" clId="{57F47F72-D214-4805-8B11-427FD8416EE3}" dt="2021-02-18T14:19:02.441" v="18" actId="403"/>
-          <ac:spMkLst>
-            <pc:docMk/>
-            <pc:sldMk cId="2177177731" sldId="599"/>
-            <ac:spMk id="2" creationId="{00000000-0000-0000-0000-000000000000}"/>
-          </ac:spMkLst>
-        </pc:spChg>
-      </pc:sldChg>
-      <pc:sldChg chg="modSp modAnim">
-        <pc:chgData name="Gerson" userId="6c4494c9-e300-475e-8570-19c96c3d8172" providerId="ADAL" clId="{57F47F72-D214-4805-8B11-427FD8416EE3}" dt="2021-02-18T17:02:18.314" v="423" actId="6549"/>
-        <pc:sldMkLst>
-          <pc:docMk/>
-          <pc:sldMk cId="1398324226" sldId="601"/>
-        </pc:sldMkLst>
-        <pc:spChg chg="mod">
-          <ac:chgData name="Gerson" userId="6c4494c9-e300-475e-8570-19c96c3d8172" providerId="ADAL" clId="{57F47F72-D214-4805-8B11-427FD8416EE3}" dt="2021-02-18T17:02:18.314" v="423" actId="6549"/>
-          <ac:spMkLst>
-            <pc:docMk/>
-            <pc:sldMk cId="1398324226" sldId="601"/>
-            <ac:spMk id="2" creationId="{00000000-0000-0000-0000-000000000000}"/>
-          </ac:spMkLst>
-        </pc:spChg>
-      </pc:sldChg>
-      <pc:sldChg chg="del">
-        <pc:chgData name="Gerson" userId="6c4494c9-e300-475e-8570-19c96c3d8172" providerId="ADAL" clId="{57F47F72-D214-4805-8B11-427FD8416EE3}" dt="2021-02-18T14:24:15.745" v="411" actId="47"/>
-        <pc:sldMkLst>
-          <pc:docMk/>
-          <pc:sldMk cId="801199801" sldId="603"/>
-        </pc:sldMkLst>
-      </pc:sldChg>
-      <pc:sldChg chg="del">
-        <pc:chgData name="Gerson" userId="6c4494c9-e300-475e-8570-19c96c3d8172" providerId="ADAL" clId="{57F47F72-D214-4805-8B11-427FD8416EE3}" dt="2021-02-18T14:24:13.277" v="410" actId="47"/>
-        <pc:sldMkLst>
-          <pc:docMk/>
-          <pc:sldMk cId="2938640072" sldId="604"/>
-        </pc:sldMkLst>
-      </pc:sldChg>
-      <pc:sldChg chg="modSp del mod ord">
-        <pc:chgData name="Gerson" userId="6c4494c9-e300-475e-8570-19c96c3d8172" providerId="ADAL" clId="{57F47F72-D214-4805-8B11-427FD8416EE3}" dt="2021-02-18T17:29:10.467" v="434" actId="47"/>
-        <pc:sldMkLst>
-          <pc:docMk/>
-          <pc:sldMk cId="4114683031" sldId="615"/>
-        </pc:sldMkLst>
-        <pc:spChg chg="mod">
-          <ac:chgData name="Gerson" userId="6c4494c9-e300-475e-8570-19c96c3d8172" providerId="ADAL" clId="{57F47F72-D214-4805-8B11-427FD8416EE3}" dt="2021-02-18T14:23:54.928" v="409" actId="6549"/>
-          <ac:spMkLst>
-            <pc:docMk/>
-            <pc:sldMk cId="4114683031" sldId="615"/>
-            <ac:spMk id="6" creationId="{FA09424E-04A1-461B-B173-B1448D152853}"/>
-          </ac:spMkLst>
-        </pc:spChg>
-      </pc:sldChg>
-      <pc:sldChg chg="modSp add del modAnim">
-        <pc:chgData name="Gerson" userId="6c4494c9-e300-475e-8570-19c96c3d8172" providerId="ADAL" clId="{57F47F72-D214-4805-8B11-427FD8416EE3}" dt="2021-02-18T17:28:27.765" v="426"/>
-        <pc:sldMkLst>
-          <pc:docMk/>
-          <pc:sldMk cId="2820918408" sldId="616"/>
-        </pc:sldMkLst>
-        <pc:spChg chg="mod">
-          <ac:chgData name="Gerson" userId="6c4494c9-e300-475e-8570-19c96c3d8172" providerId="ADAL" clId="{57F47F72-D214-4805-8B11-427FD8416EE3}" dt="2021-02-18T14:19:36.729" v="59" actId="20577"/>
-          <ac:spMkLst>
-            <pc:docMk/>
-            <pc:sldMk cId="2820918408" sldId="616"/>
-            <ac:spMk id="2" creationId="{00000000-0000-0000-0000-000000000000}"/>
-          </ac:spMkLst>
-        </pc:spChg>
-      </pc:sldChg>
-      <pc:sldChg chg="modSp del mod">
-        <pc:chgData name="Gerson" userId="6c4494c9-e300-475e-8570-19c96c3d8172" providerId="ADAL" clId="{57F47F72-D214-4805-8B11-427FD8416EE3}" dt="2021-02-18T17:28:51.256" v="431" actId="47"/>
-        <pc:sldMkLst>
-          <pc:docMk/>
-          <pc:sldMk cId="747581455" sldId="620"/>
-        </pc:sldMkLst>
-        <pc:spChg chg="mod">
-          <ac:chgData name="Gerson" userId="6c4494c9-e300-475e-8570-19c96c3d8172" providerId="ADAL" clId="{57F47F72-D214-4805-8B11-427FD8416EE3}" dt="2021-02-18T14:21:32.988" v="150" actId="20577"/>
-          <ac:spMkLst>
-            <pc:docMk/>
-            <pc:sldMk cId="747581455" sldId="620"/>
-            <ac:spMk id="4" creationId="{00000000-0000-0000-0000-000000000000}"/>
-          </ac:spMkLst>
-        </pc:spChg>
-        <pc:spChg chg="mod">
-          <ac:chgData name="Gerson" userId="6c4494c9-e300-475e-8570-19c96c3d8172" providerId="ADAL" clId="{57F47F72-D214-4805-8B11-427FD8416EE3}" dt="2021-02-18T17:02:35.309" v="424" actId="1076"/>
-          <ac:spMkLst>
-            <pc:docMk/>
-            <pc:sldMk cId="747581455" sldId="620"/>
-            <ac:spMk id="8" creationId="{7996320F-8012-42D5-A8E9-DDE68A5940E9}"/>
-          </ac:spMkLst>
-        </pc:spChg>
-      </pc:sldChg>
-      <pc:sldChg chg="modSp add del mod">
-        <pc:chgData name="Gerson" userId="6c4494c9-e300-475e-8570-19c96c3d8172" providerId="ADAL" clId="{57F47F72-D214-4805-8B11-427FD8416EE3}" dt="2021-02-18T17:29:09.500" v="433" actId="47"/>
-        <pc:sldMkLst>
-          <pc:docMk/>
-          <pc:sldMk cId="1446799968" sldId="622"/>
-        </pc:sldMkLst>
-        <pc:spChg chg="mod">
-          <ac:chgData name="Gerson" userId="6c4494c9-e300-475e-8570-19c96c3d8172" providerId="ADAL" clId="{57F47F72-D214-4805-8B11-427FD8416EE3}" dt="2021-02-18T14:22:44.065" v="264" actId="20577"/>
-          <ac:spMkLst>
-            <pc:docMk/>
-            <pc:sldMk cId="1446799968" sldId="622"/>
-            <ac:spMk id="4" creationId="{00000000-0000-0000-0000-000000000000}"/>
-          </ac:spMkLst>
-        </pc:spChg>
-        <pc:spChg chg="mod">
-          <ac:chgData name="Gerson" userId="6c4494c9-e300-475e-8570-19c96c3d8172" providerId="ADAL" clId="{57F47F72-D214-4805-8B11-427FD8416EE3}" dt="2021-02-18T14:23:17.488" v="349" actId="20577"/>
-          <ac:spMkLst>
-            <pc:docMk/>
-            <pc:sldMk cId="1446799968" sldId="622"/>
-            <ac:spMk id="6" creationId="{FA09424E-04A1-461B-B173-B1448D152853}"/>
-          </ac:spMkLst>
-        </pc:spChg>
-      </pc:sldChg>
-      <pc:sldChg chg="modSp add del mod">
-        <pc:chgData name="Gerson" userId="6c4494c9-e300-475e-8570-19c96c3d8172" providerId="ADAL" clId="{57F47F72-D214-4805-8B11-427FD8416EE3}" dt="2021-02-18T14:23:42.353" v="383" actId="47"/>
-        <pc:sldMkLst>
-          <pc:docMk/>
-          <pc:sldMk cId="492763629" sldId="623"/>
-        </pc:sldMkLst>
-        <pc:spChg chg="mod">
-          <ac:chgData name="Gerson" userId="6c4494c9-e300-475e-8570-19c96c3d8172" providerId="ADAL" clId="{57F47F72-D214-4805-8B11-427FD8416EE3}" dt="2021-02-18T14:23:29.011" v="380" actId="20577"/>
-          <ac:spMkLst>
-            <pc:docMk/>
-            <pc:sldMk cId="492763629" sldId="623"/>
-            <ac:spMk id="6" creationId="{FA09424E-04A1-461B-B173-B1448D152853}"/>
-          </ac:spMkLst>
-        </pc:spChg>
-      </pc:sldChg>
-      <pc:sldChg chg="add">
-        <pc:chgData name="Gerson" userId="6c4494c9-e300-475e-8570-19c96c3d8172" providerId="ADAL" clId="{57F47F72-D214-4805-8B11-427FD8416EE3}" dt="2021-02-18T17:28:32.060" v="427"/>
-        <pc:sldMkLst>
-          <pc:docMk/>
-          <pc:sldMk cId="2114404914" sldId="623"/>
-        </pc:sldMkLst>
-      </pc:sldChg>
-      <pc:sldChg chg="add">
-        <pc:chgData name="Gerson" userId="6c4494c9-e300-475e-8570-19c96c3d8172" providerId="ADAL" clId="{57F47F72-D214-4805-8B11-427FD8416EE3}" dt="2021-02-18T17:28:27.765" v="426"/>
-        <pc:sldMkLst>
-          <pc:docMk/>
-          <pc:sldMk cId="2328458479" sldId="624"/>
-        </pc:sldMkLst>
-      </pc:sldChg>
-      <pc:sldChg chg="add">
-        <pc:chgData name="Gerson" userId="6c4494c9-e300-475e-8570-19c96c3d8172" providerId="ADAL" clId="{57F47F72-D214-4805-8B11-427FD8416EE3}" dt="2021-02-18T17:28:49.674" v="430"/>
-        <pc:sldMkLst>
-          <pc:docMk/>
-          <pc:sldMk cId="1173506212" sldId="625"/>
-        </pc:sldMkLst>
-      </pc:sldChg>
-      <pc:sldChg chg="add">
-        <pc:chgData name="Gerson" userId="6c4494c9-e300-475e-8570-19c96c3d8172" providerId="ADAL" clId="{57F47F72-D214-4805-8B11-427FD8416EE3}" dt="2021-02-18T17:29:06.498" v="432"/>
-        <pc:sldMkLst>
-          <pc:docMk/>
-          <pc:sldMk cId="1915638063" sldId="626"/>
-        </pc:sldMkLst>
-      </pc:sldChg>
-      <pc:sldChg chg="add">
-        <pc:chgData name="Gerson" userId="6c4494c9-e300-475e-8570-19c96c3d8172" providerId="ADAL" clId="{57F47F72-D214-4805-8B11-427FD8416EE3}" dt="2021-02-18T17:29:06.498" v="432"/>
-        <pc:sldMkLst>
-          <pc:docMk/>
-          <pc:sldMk cId="2847436393" sldId="627"/>
-        </pc:sldMkLst>
-      </pc:sldChg>
-    </pc:docChg>
-  </pc:docChgLst>
-  <pc:docChgLst>
-    <pc:chgData name="Gerson Santos" userId="6c4494c9-e300-475e-8570-19c96c3d8172" providerId="ADAL" clId="{BADD4FA8-E003-4A84-A253-C77F68F56F74}"/>
-    <pc:docChg chg="custSel addSld delSld modSld sldOrd">
-      <pc:chgData name="Gerson Santos" userId="6c4494c9-e300-475e-8570-19c96c3d8172" providerId="ADAL" clId="{BADD4FA8-E003-4A84-A253-C77F68F56F74}" dt="2021-08-10T16:53:57.329" v="354" actId="729"/>
-      <pc:docMkLst>
-        <pc:docMk/>
-      </pc:docMkLst>
-      <pc:sldChg chg="del">
-        <pc:chgData name="Gerson Santos" userId="6c4494c9-e300-475e-8570-19c96c3d8172" providerId="ADAL" clId="{BADD4FA8-E003-4A84-A253-C77F68F56F74}" dt="2021-08-10T16:29:54.021" v="73" actId="47"/>
-        <pc:sldMkLst>
-          <pc:docMk/>
-          <pc:sldMk cId="1091756452" sldId="291"/>
-        </pc:sldMkLst>
-      </pc:sldChg>
-      <pc:sldChg chg="mod modShow">
-        <pc:chgData name="Gerson Santos" userId="6c4494c9-e300-475e-8570-19c96c3d8172" providerId="ADAL" clId="{BADD4FA8-E003-4A84-A253-C77F68F56F74}" dt="2021-08-10T14:16:54.780" v="23" actId="729"/>
-        <pc:sldMkLst>
-          <pc:docMk/>
-          <pc:sldMk cId="2415085052" sldId="593"/>
-        </pc:sldMkLst>
-      </pc:sldChg>
-      <pc:sldChg chg="del">
-        <pc:chgData name="Gerson Santos" userId="6c4494c9-e300-475e-8570-19c96c3d8172" providerId="ADAL" clId="{BADD4FA8-E003-4A84-A253-C77F68F56F74}" dt="2021-08-10T14:16:07.043" v="0" actId="47"/>
-        <pc:sldMkLst>
-          <pc:docMk/>
-          <pc:sldMk cId="2177177731" sldId="599"/>
-        </pc:sldMkLst>
-      </pc:sldChg>
-      <pc:sldChg chg="modSp mod">
-        <pc:chgData name="Gerson Santos" userId="6c4494c9-e300-475e-8570-19c96c3d8172" providerId="ADAL" clId="{BADD4FA8-E003-4A84-A253-C77F68F56F74}" dt="2021-08-10T14:17:16.859" v="24" actId="1076"/>
-        <pc:sldMkLst>
-          <pc:docMk/>
-          <pc:sldMk cId="1010721534" sldId="600"/>
-        </pc:sldMkLst>
-        <pc:picChg chg="mod">
-          <ac:chgData name="Gerson Santos" userId="6c4494c9-e300-475e-8570-19c96c3d8172" providerId="ADAL" clId="{BADD4FA8-E003-4A84-A253-C77F68F56F74}" dt="2021-08-10T14:17:16.859" v="24" actId="1076"/>
-          <ac:picMkLst>
-            <pc:docMk/>
-            <pc:sldMk cId="1010721534" sldId="600"/>
-            <ac:picMk id="29" creationId="{19B3DCB4-A744-41A9-9082-4FA04F7F8229}"/>
-          </ac:picMkLst>
-        </pc:picChg>
-      </pc:sldChg>
-      <pc:sldChg chg="modSp mod">
-        <pc:chgData name="Gerson Santos" userId="6c4494c9-e300-475e-8570-19c96c3d8172" providerId="ADAL" clId="{BADD4FA8-E003-4A84-A253-C77F68F56F74}" dt="2021-08-10T14:17:55.803" v="71" actId="20577"/>
-        <pc:sldMkLst>
-          <pc:docMk/>
-          <pc:sldMk cId="83263419" sldId="607"/>
-        </pc:sldMkLst>
-        <pc:spChg chg="mod">
-          <ac:chgData name="Gerson Santos" userId="6c4494c9-e300-475e-8570-19c96c3d8172" providerId="ADAL" clId="{BADD4FA8-E003-4A84-A253-C77F68F56F74}" dt="2021-08-10T14:17:55.803" v="71" actId="20577"/>
-          <ac:spMkLst>
-            <pc:docMk/>
-            <pc:sldMk cId="83263419" sldId="607"/>
-            <ac:spMk id="2" creationId="{00000000-0000-0000-0000-000000000000}"/>
-          </ac:spMkLst>
-        </pc:spChg>
-      </pc:sldChg>
-      <pc:sldChg chg="modSp modAnim">
-        <pc:chgData name="Gerson Santos" userId="6c4494c9-e300-475e-8570-19c96c3d8172" providerId="ADAL" clId="{BADD4FA8-E003-4A84-A253-C77F68F56F74}" dt="2021-08-10T14:16:24.834" v="22" actId="20577"/>
-        <pc:sldMkLst>
-          <pc:docMk/>
-          <pc:sldMk cId="2820918408" sldId="616"/>
-        </pc:sldMkLst>
-        <pc:spChg chg="mod">
-          <ac:chgData name="Gerson Santos" userId="6c4494c9-e300-475e-8570-19c96c3d8172" providerId="ADAL" clId="{BADD4FA8-E003-4A84-A253-C77F68F56F74}" dt="2021-08-10T14:16:24.834" v="22" actId="20577"/>
-          <ac:spMkLst>
-            <pc:docMk/>
-            <pc:sldMk cId="2820918408" sldId="616"/>
-            <ac:spMk id="2" creationId="{00000000-0000-0000-0000-000000000000}"/>
-          </ac:spMkLst>
-        </pc:spChg>
-      </pc:sldChg>
-      <pc:sldChg chg="mod modShow">
-        <pc:chgData name="Gerson Santos" userId="6c4494c9-e300-475e-8570-19c96c3d8172" providerId="ADAL" clId="{BADD4FA8-E003-4A84-A253-C77F68F56F74}" dt="2021-08-10T16:45:50.187" v="270" actId="729"/>
-        <pc:sldMkLst>
-          <pc:docMk/>
-          <pc:sldMk cId="3128149770" sldId="617"/>
-        </pc:sldMkLst>
-      </pc:sldChg>
-      <pc:sldChg chg="del">
-        <pc:chgData name="Gerson Santos" userId="6c4494c9-e300-475e-8570-19c96c3d8172" providerId="ADAL" clId="{BADD4FA8-E003-4A84-A253-C77F68F56F74}" dt="2021-08-10T14:17:23.823" v="25" actId="47"/>
-        <pc:sldMkLst>
-          <pc:docMk/>
-          <pc:sldMk cId="1915638063" sldId="626"/>
-        </pc:sldMkLst>
-      </pc:sldChg>
-      <pc:sldChg chg="modSp mod ord">
-        <pc:chgData name="Gerson Santos" userId="6c4494c9-e300-475e-8570-19c96c3d8172" providerId="ADAL" clId="{BADD4FA8-E003-4A84-A253-C77F68F56F74}" dt="2021-08-10T16:46:02.132" v="272"/>
-        <pc:sldMkLst>
-          <pc:docMk/>
-          <pc:sldMk cId="2847436393" sldId="627"/>
-        </pc:sldMkLst>
-        <pc:spChg chg="mod">
-          <ac:chgData name="Gerson Santos" userId="6c4494c9-e300-475e-8570-19c96c3d8172" providerId="ADAL" clId="{BADD4FA8-E003-4A84-A253-C77F68F56F74}" dt="2021-08-10T14:17:34.764" v="59" actId="20577"/>
-          <ac:spMkLst>
-            <pc:docMk/>
-            <pc:sldMk cId="2847436393" sldId="627"/>
-            <ac:spMk id="4" creationId="{00000000-0000-0000-0000-000000000000}"/>
-          </ac:spMkLst>
-        </pc:spChg>
-        <pc:spChg chg="mod">
-          <ac:chgData name="Gerson Santos" userId="6c4494c9-e300-475e-8570-19c96c3d8172" providerId="ADAL" clId="{BADD4FA8-E003-4A84-A253-C77F68F56F74}" dt="2021-08-10T14:17:41.320" v="61" actId="20577"/>
-          <ac:spMkLst>
-            <pc:docMk/>
-            <pc:sldMk cId="2847436393" sldId="627"/>
-            <ac:spMk id="6" creationId="{FA09424E-04A1-461B-B173-B1448D152853}"/>
-          </ac:spMkLst>
-        </pc:spChg>
-      </pc:sldChg>
-      <pc:sldChg chg="add">
-        <pc:chgData name="Gerson Santos" userId="6c4494c9-e300-475e-8570-19c96c3d8172" providerId="ADAL" clId="{BADD4FA8-E003-4A84-A253-C77F68F56F74}" dt="2021-08-10T16:29:51.828" v="72"/>
-        <pc:sldMkLst>
-          <pc:docMk/>
-          <pc:sldMk cId="3232656943" sldId="630"/>
-        </pc:sldMkLst>
-      </pc:sldChg>
-      <pc:sldChg chg="add">
-        <pc:chgData name="Gerson Santos" userId="6c4494c9-e300-475e-8570-19c96c3d8172" providerId="ADAL" clId="{BADD4FA8-E003-4A84-A253-C77F68F56F74}" dt="2021-08-10T16:29:51.828" v="72"/>
-        <pc:sldMkLst>
-          <pc:docMk/>
-          <pc:sldMk cId="3231025939" sldId="631"/>
-        </pc:sldMkLst>
-      </pc:sldChg>
-      <pc:sldChg chg="delSp modSp add mod">
-        <pc:chgData name="Gerson Santos" userId="6c4494c9-e300-475e-8570-19c96c3d8172" providerId="ADAL" clId="{BADD4FA8-E003-4A84-A253-C77F68F56F74}" dt="2021-08-10T16:46:44.471" v="352" actId="20577"/>
-        <pc:sldMkLst>
-          <pc:docMk/>
-          <pc:sldMk cId="1109227438" sldId="632"/>
-        </pc:sldMkLst>
-        <pc:spChg chg="mod">
-          <ac:chgData name="Gerson Santos" userId="6c4494c9-e300-475e-8570-19c96c3d8172" providerId="ADAL" clId="{BADD4FA8-E003-4A84-A253-C77F68F56F74}" dt="2021-08-10T16:43:53.754" v="245" actId="14100"/>
-          <ac:spMkLst>
-            <pc:docMk/>
-            <pc:sldMk cId="1109227438" sldId="632"/>
-            <ac:spMk id="7" creationId="{00000000-0000-0000-0000-000000000000}"/>
-          </ac:spMkLst>
-        </pc:spChg>
-        <pc:spChg chg="del">
-          <ac:chgData name="Gerson Santos" userId="6c4494c9-e300-475e-8570-19c96c3d8172" providerId="ADAL" clId="{BADD4FA8-E003-4A84-A253-C77F68F56F74}" dt="2021-08-10T16:31:14.647" v="87" actId="478"/>
-          <ac:spMkLst>
-            <pc:docMk/>
-            <pc:sldMk cId="1109227438" sldId="632"/>
-            <ac:spMk id="8" creationId="{00000000-0000-0000-0000-000000000000}"/>
-          </ac:spMkLst>
-        </pc:spChg>
-        <pc:spChg chg="mod">
-          <ac:chgData name="Gerson Santos" userId="6c4494c9-e300-475e-8570-19c96c3d8172" providerId="ADAL" clId="{BADD4FA8-E003-4A84-A253-C77F68F56F74}" dt="2021-08-10T16:46:31.114" v="288" actId="20577"/>
-          <ac:spMkLst>
-            <pc:docMk/>
-            <pc:sldMk cId="1109227438" sldId="632"/>
-            <ac:spMk id="13" creationId="{00000000-0000-0000-0000-000000000000}"/>
-          </ac:spMkLst>
-        </pc:spChg>
-        <pc:spChg chg="mod">
-          <ac:chgData name="Gerson Santos" userId="6c4494c9-e300-475e-8570-19c96c3d8172" providerId="ADAL" clId="{BADD4FA8-E003-4A84-A253-C77F68F56F74}" dt="2021-08-10T16:46:44.471" v="352" actId="20577"/>
-          <ac:spMkLst>
-            <pc:docMk/>
-            <pc:sldMk cId="1109227438" sldId="632"/>
-            <ac:spMk id="14" creationId="{00000000-0000-0000-0000-000000000000}"/>
-          </ac:spMkLst>
-        </pc:spChg>
-        <pc:spChg chg="mod">
-          <ac:chgData name="Gerson Santos" userId="6c4494c9-e300-475e-8570-19c96c3d8172" providerId="ADAL" clId="{BADD4FA8-E003-4A84-A253-C77F68F56F74}" dt="2021-08-10T16:43:58.695" v="269" actId="1036"/>
-          <ac:spMkLst>
-            <pc:docMk/>
-            <pc:sldMk cId="1109227438" sldId="632"/>
-            <ac:spMk id="16" creationId="{00000000-0000-0000-0000-000000000000}"/>
-          </ac:spMkLst>
-        </pc:spChg>
-        <pc:spChg chg="mod">
-          <ac:chgData name="Gerson Santos" userId="6c4494c9-e300-475e-8570-19c96c3d8172" providerId="ADAL" clId="{BADD4FA8-E003-4A84-A253-C77F68F56F74}" dt="2021-08-10T16:30:12.117" v="85" actId="20577"/>
-          <ac:spMkLst>
-            <pc:docMk/>
-            <pc:sldMk cId="1109227438" sldId="632"/>
-            <ac:spMk id="18" creationId="{00000000-0000-0000-0000-000000000000}"/>
-          </ac:spMkLst>
-        </pc:spChg>
-        <pc:spChg chg="del">
-          <ac:chgData name="Gerson Santos" userId="6c4494c9-e300-475e-8570-19c96c3d8172" providerId="ADAL" clId="{BADD4FA8-E003-4A84-A253-C77F68F56F74}" dt="2021-08-10T16:31:16.911" v="88" actId="478"/>
-          <ac:spMkLst>
-            <pc:docMk/>
-            <pc:sldMk cId="1109227438" sldId="632"/>
-            <ac:spMk id="21" creationId="{00000000-0000-0000-0000-000000000000}"/>
-          </ac:spMkLst>
-        </pc:spChg>
-        <pc:spChg chg="del mod">
-          <ac:chgData name="Gerson Santos" userId="6c4494c9-e300-475e-8570-19c96c3d8172" providerId="ADAL" clId="{BADD4FA8-E003-4A84-A253-C77F68F56F74}" dt="2021-08-10T16:31:16.911" v="88" actId="478"/>
-          <ac:spMkLst>
-            <pc:docMk/>
-            <pc:sldMk cId="1109227438" sldId="632"/>
-            <ac:spMk id="22" creationId="{00000000-0000-0000-0000-000000000000}"/>
-          </ac:spMkLst>
-        </pc:spChg>
-      </pc:sldChg>
-      <pc:sldChg chg="modSp add">
-        <pc:chgData name="Gerson Santos" userId="6c4494c9-e300-475e-8570-19c96c3d8172" providerId="ADAL" clId="{BADD4FA8-E003-4A84-A253-C77F68F56F74}" dt="2021-08-10T16:31:43.978" v="90" actId="6549"/>
-        <pc:sldMkLst>
-          <pc:docMk/>
-          <pc:sldMk cId="3211788106" sldId="633"/>
-        </pc:sldMkLst>
-        <pc:spChg chg="mod">
-          <ac:chgData name="Gerson Santos" userId="6c4494c9-e300-475e-8570-19c96c3d8172" providerId="ADAL" clId="{BADD4FA8-E003-4A84-A253-C77F68F56F74}" dt="2021-08-10T16:31:43.978" v="90" actId="6549"/>
-          <ac:spMkLst>
-            <pc:docMk/>
-            <pc:sldMk cId="3211788106" sldId="633"/>
-            <ac:spMk id="2" creationId="{00000000-0000-0000-0000-000000000000}"/>
-          </ac:spMkLst>
-        </pc:spChg>
-      </pc:sldChg>
-      <pc:sldChg chg="add mod modShow">
-        <pc:chgData name="Gerson Santos" userId="6c4494c9-e300-475e-8570-19c96c3d8172" providerId="ADAL" clId="{BADD4FA8-E003-4A84-A253-C77F68F56F74}" dt="2021-08-10T16:53:57.329" v="354" actId="729"/>
-        <pc:sldMkLst>
-          <pc:docMk/>
-          <pc:sldMk cId="673390320" sldId="898"/>
-        </pc:sldMkLst>
-      </pc:sldChg>
-    </pc:docChg>
-  </pc:docChgLst>
 </pc:chgInfo>
 </file>
 
@@ -2276,7 +2276,7 @@
             <a:fld id="{C3CD65D1-5C11-455D-9F9A-0E035F00A0DA}" type="datetimeFigureOut">
               <a:rPr lang="pt-BR" smtClean="0"/>
               <a:pPr/>
-              <a:t>10/08/2021</a:t>
+              <a:t>14/08/2021</a:t>
             </a:fld>
             <a:endParaRPr lang="pt-BR"/>
           </a:p>
@@ -2444,7 +2444,7 @@
             <a:fld id="{A05DA3EF-18EA-43DE-B1BB-402A3C558822}" type="datetimeFigureOut">
               <a:rPr lang="pt-BR" smtClean="0"/>
               <a:pPr/>
-              <a:t>10/08/2021</a:t>
+              <a:t>14/08/2021</a:t>
             </a:fld>
             <a:endParaRPr lang="pt-BR"/>
           </a:p>
@@ -14197,8 +14197,8 @@
         </p:nvSpPr>
         <p:spPr>
           <a:xfrm>
-            <a:off x="610094" y="1278571"/>
-            <a:ext cx="12448085" cy="3312368"/>
+            <a:off x="610094" y="1278570"/>
+            <a:ext cx="12448085" cy="4758435"/>
           </a:xfrm>
         </p:spPr>
         <p:txBody>
@@ -14218,6 +14218,11 @@
               <a:rPr lang="pt-BR" dirty="0"/>
               <a:t>R: </a:t>
             </a:r>
+            <a:r>
+              <a:rPr lang="pt-BR" dirty="0" err="1"/>
+              <a:t>TothLibs</a:t>
+            </a:r>
+            <a:endParaRPr lang="pt-BR" dirty="0"/>
           </a:p>
           <a:p>
             <a:pPr marL="0" indent="0">
@@ -14235,6 +14240,16 @@
             <a:pPr marL="0" indent="0">
               <a:buNone/>
             </a:pPr>
+            <a:endParaRPr lang="pt-BR" sz="3600" dirty="0"/>
+          </a:p>
+          <a:p>
+            <a:pPr marL="0" indent="0">
+              <a:buNone/>
+            </a:pPr>
+            <a:r>
+              <a:rPr lang="pt-BR" sz="3600"/>
+              <a:t>****se já tem os nomes</a:t>
+            </a:r>
             <a:endParaRPr lang="pt-BR" sz="3600" dirty="0"/>
           </a:p>
           <a:p>
@@ -14476,6 +14491,55 @@
                                           <p:spTgt spid="2">
                                             <p:txEl>
                                               <p:pRg st="3" end="3"/>
+                                            </p:txEl>
+                                          </p:spTgt>
+                                        </p:tgtEl>
+                                        <p:attrNameLst>
+                                          <p:attrName>style.visibility</p:attrName>
+                                        </p:attrNameLst>
+                                      </p:cBhvr>
+                                      <p:to>
+                                        <p:strVal val="visible"/>
+                                      </p:to>
+                                    </p:set>
+                                  </p:childTnLst>
+                                </p:cTn>
+                              </p:par>
+                            </p:childTnLst>
+                          </p:cTn>
+                        </p:par>
+                      </p:childTnLst>
+                    </p:cTn>
+                  </p:par>
+                  <p:par>
+                    <p:cTn id="15" fill="hold">
+                      <p:stCondLst>
+                        <p:cond delay="indefinite"/>
+                      </p:stCondLst>
+                      <p:childTnLst>
+                        <p:par>
+                          <p:cTn id="16" fill="hold">
+                            <p:stCondLst>
+                              <p:cond delay="0"/>
+                            </p:stCondLst>
+                            <p:childTnLst>
+                              <p:par>
+                                <p:cTn id="17" presetID="1" presetClass="entr" presetSubtype="0" fill="hold" grpId="0" nodeType="clickEffect">
+                                  <p:stCondLst>
+                                    <p:cond delay="0"/>
+                                  </p:stCondLst>
+                                  <p:childTnLst>
+                                    <p:set>
+                                      <p:cBhvr>
+                                        <p:cTn id="18" dur="1" fill="hold">
+                                          <p:stCondLst>
+                                            <p:cond delay="0"/>
+                                          </p:stCondLst>
+                                        </p:cTn>
+                                        <p:tgtEl>
+                                          <p:spTgt spid="2">
+                                            <p:txEl>
+                                              <p:pRg st="5" end="5"/>
                                             </p:txEl>
                                           </p:spTgt>
                                         </p:tgtEl>
@@ -15040,19 +15104,73 @@
         </p:nvSpPr>
         <p:spPr>
           <a:xfrm>
-            <a:off x="610094" y="1278571"/>
-            <a:ext cx="12448085" cy="3312368"/>
+            <a:off x="610094" y="1278570"/>
+            <a:ext cx="12448085" cy="3903029"/>
           </a:xfrm>
         </p:spPr>
         <p:txBody>
           <a:bodyPr/>
           <a:lstStyle/>
           <a:p>
+            <a:pPr algn="just"/>
             <a:r>
-              <a:rPr lang="pt-BR" dirty="0"/>
-              <a:t>Coloque detalhes do que foi pesquisado, como links que apontam para vídeos e documentos.</a:t>
+              <a:rPr lang="pt-BR" sz="2000" dirty="0"/>
+              <a:t>Baseado em nossas experiências com instituições de ensino pudemos observara a constante precariedade e por vezes o descaso com as bibliotecas, muitas delas utilizando papel e caneta com método para controle estoque e gerenciamento da entrada saída de livros do seu acervo.</a:t>
             </a:r>
-            <a:endParaRPr lang="pt-BR" sz="3600" dirty="0"/>
+          </a:p>
+          <a:p>
+            <a:pPr marL="0" indent="0" algn="just">
+              <a:buNone/>
+            </a:pPr>
+            <a:endParaRPr lang="pt-BR" sz="2000" dirty="0"/>
+          </a:p>
+          <a:p>
+            <a:pPr algn="just"/>
+            <a:r>
+              <a:rPr lang="pt-BR" sz="2000" dirty="0"/>
+              <a:t>Com nossas pesquisas de mercado concluímos que nossos concorrentes são principalmente empresas que atuam no mercado de softwares para controle estoque no geral, tais como: </a:t>
+            </a:r>
+            <a:r>
+              <a:rPr lang="pt-BR" sz="2000" dirty="0" err="1"/>
+              <a:t>Nexux</a:t>
+            </a:r>
+            <a:r>
+              <a:rPr lang="pt-BR" sz="2000" dirty="0"/>
+              <a:t>, </a:t>
+            </a:r>
+            <a:r>
+              <a:rPr lang="pt-BR" sz="2000" dirty="0" err="1"/>
+              <a:t>Linx</a:t>
+            </a:r>
+            <a:r>
+              <a:rPr lang="pt-BR" sz="2000" dirty="0"/>
+              <a:t>, </a:t>
+            </a:r>
+            <a:r>
+              <a:rPr lang="pt-BR" sz="2000" dirty="0" err="1"/>
+              <a:t>Tovts</a:t>
+            </a:r>
+            <a:r>
+              <a:rPr lang="pt-BR" sz="2000" dirty="0"/>
+              <a:t> e SAP.</a:t>
+            </a:r>
+          </a:p>
+          <a:p>
+            <a:endParaRPr lang="pt-BR" sz="2400" dirty="0"/>
+          </a:p>
+          <a:p>
+            <a:r>
+              <a:rPr lang="pt-BR" sz="2400" dirty="0"/>
+              <a:t>Nosso diferencial consiste no modelo de entra de software Taylor </a:t>
+            </a:r>
+            <a:r>
+              <a:rPr lang="pt-BR" sz="2400" dirty="0" err="1"/>
+              <a:t>Made</a:t>
+            </a:r>
+            <a:r>
+              <a:rPr lang="pt-BR" sz="2400" dirty="0"/>
+              <a:t>, onde implementamos o sistemas com as especificações mais adequadas para cada cliente com isso atendendo suas dores e otimizando todo o processo de gerenciamento de estoque.</a:t>
+            </a:r>
           </a:p>
           <a:p>
             <a:endParaRPr lang="pt-BR" sz="2400" dirty="0">
@@ -15202,6 +15320,104 @@
                                           <p:spTgt spid="2">
                                             <p:txEl>
                                               <p:pRg st="0" end="0"/>
+                                            </p:txEl>
+                                          </p:spTgt>
+                                        </p:tgtEl>
+                                        <p:attrNameLst>
+                                          <p:attrName>style.visibility</p:attrName>
+                                        </p:attrNameLst>
+                                      </p:cBhvr>
+                                      <p:to>
+                                        <p:strVal val="visible"/>
+                                      </p:to>
+                                    </p:set>
+                                  </p:childTnLst>
+                                </p:cTn>
+                              </p:par>
+                            </p:childTnLst>
+                          </p:cTn>
+                        </p:par>
+                      </p:childTnLst>
+                    </p:cTn>
+                  </p:par>
+                  <p:par>
+                    <p:cTn id="7" fill="hold">
+                      <p:stCondLst>
+                        <p:cond delay="indefinite"/>
+                      </p:stCondLst>
+                      <p:childTnLst>
+                        <p:par>
+                          <p:cTn id="8" fill="hold">
+                            <p:stCondLst>
+                              <p:cond delay="0"/>
+                            </p:stCondLst>
+                            <p:childTnLst>
+                              <p:par>
+                                <p:cTn id="9" presetID="1" presetClass="entr" presetSubtype="0" fill="hold" grpId="0" nodeType="clickEffect">
+                                  <p:stCondLst>
+                                    <p:cond delay="0"/>
+                                  </p:stCondLst>
+                                  <p:childTnLst>
+                                    <p:set>
+                                      <p:cBhvr>
+                                        <p:cTn id="10" dur="1" fill="hold">
+                                          <p:stCondLst>
+                                            <p:cond delay="0"/>
+                                          </p:stCondLst>
+                                        </p:cTn>
+                                        <p:tgtEl>
+                                          <p:spTgt spid="2">
+                                            <p:txEl>
+                                              <p:pRg st="2" end="2"/>
+                                            </p:txEl>
+                                          </p:spTgt>
+                                        </p:tgtEl>
+                                        <p:attrNameLst>
+                                          <p:attrName>style.visibility</p:attrName>
+                                        </p:attrNameLst>
+                                      </p:cBhvr>
+                                      <p:to>
+                                        <p:strVal val="visible"/>
+                                      </p:to>
+                                    </p:set>
+                                  </p:childTnLst>
+                                </p:cTn>
+                              </p:par>
+                            </p:childTnLst>
+                          </p:cTn>
+                        </p:par>
+                      </p:childTnLst>
+                    </p:cTn>
+                  </p:par>
+                  <p:par>
+                    <p:cTn id="11" fill="hold">
+                      <p:stCondLst>
+                        <p:cond delay="indefinite"/>
+                      </p:stCondLst>
+                      <p:childTnLst>
+                        <p:par>
+                          <p:cTn id="12" fill="hold">
+                            <p:stCondLst>
+                              <p:cond delay="0"/>
+                            </p:stCondLst>
+                            <p:childTnLst>
+                              <p:par>
+                                <p:cTn id="13" presetID="1" presetClass="entr" presetSubtype="0" fill="hold" grpId="0" nodeType="clickEffect">
+                                  <p:stCondLst>
+                                    <p:cond delay="0"/>
+                                  </p:stCondLst>
+                                  <p:childTnLst>
+                                    <p:set>
+                                      <p:cBhvr>
+                                        <p:cTn id="14" dur="1" fill="hold">
+                                          <p:stCondLst>
+                                            <p:cond delay="0"/>
+                                          </p:stCondLst>
+                                        </p:cTn>
+                                        <p:tgtEl>
+                                          <p:spTgt spid="2">
+                                            <p:txEl>
+                                              <p:pRg st="4" end="4"/>
                                             </p:txEl>
                                           </p:spTgt>
                                         </p:tgtEl>
@@ -19115,6 +19331,12 @@
 </file>
 
 <file path=customXml/item1.xml><?xml version="1.0" encoding="utf-8"?>
+<p:properties xmlns:p="http://schemas.microsoft.com/office/2006/metadata/properties" xmlns:xsi="http://www.w3.org/2001/XMLSchema-instance" xmlns:pc="http://schemas.microsoft.com/office/infopath/2007/PartnerControls">
+  <documentManagement/>
+</p:properties>
+</file>
+
+<file path=customXml/item2.xml><?xml version="1.0" encoding="utf-8"?>
 <ct:contentTypeSchema xmlns:ct="http://schemas.microsoft.com/office/2006/metadata/contentType" xmlns:ma="http://schemas.microsoft.com/office/2006/metadata/properties/metaAttributes" ct:_="" ma:_="" ma:contentTypeName="Document" ma:contentTypeID="0x0101001132905C37EA9847A7207C4BBCCCD8F4" ma:contentTypeVersion="13" ma:contentTypeDescription="Create a new document." ma:contentTypeScope="" ma:versionID="0fa59793b99d27e1e0b856ab72ac2f0d">
   <xsd:schema xmlns:xsd="http://www.w3.org/2001/XMLSchema" xmlns:xs="http://www.w3.org/2001/XMLSchema" xmlns:p="http://schemas.microsoft.com/office/2006/metadata/properties" xmlns:ns3="4327b14a-fe89-488e-9f6d-9658cacf372b" xmlns:ns4="bbcd8c33-6940-4d4c-a587-bbc736ca1e4d" targetNamespace="http://schemas.microsoft.com/office/2006/metadata/properties" ma:root="true" ma:fieldsID="01494effa1b4414faf4d9851fe547c93" ns3:_="" ns4:_="">
     <xsd:import namespace="4327b14a-fe89-488e-9f6d-9658cacf372b"/>
@@ -19337,12 +19559,6 @@
 </ct:contentTypeSchema>
 </file>
 
-<file path=customXml/item2.xml><?xml version="1.0" encoding="utf-8"?>
-<p:properties xmlns:p="http://schemas.microsoft.com/office/2006/metadata/properties" xmlns:xsi="http://www.w3.org/2001/XMLSchema-instance" xmlns:pc="http://schemas.microsoft.com/office/infopath/2007/PartnerControls">
-  <documentManagement/>
-</p:properties>
-</file>
-
 <file path=customXml/item3.xml><?xml version="1.0" encoding="utf-8"?>
 <?mso-contentType ?>
 <FormTemplates xmlns="http://schemas.microsoft.com/sharepoint/v3/contenttype/forms">
@@ -19353,6 +19569,23 @@
 </file>
 
 <file path=customXml/itemProps1.xml><?xml version="1.0" encoding="utf-8"?>
+<ds:datastoreItem xmlns:ds="http://schemas.openxmlformats.org/officeDocument/2006/customXml" ds:itemID="{08323129-B204-40D5-AFF8-9C9A9BF3922E}">
+  <ds:schemaRefs>
+    <ds:schemaRef ds:uri="http://purl.org/dc/terms/"/>
+    <ds:schemaRef ds:uri="http://purl.org/dc/dcmitype/"/>
+    <ds:schemaRef ds:uri="http://schemas.microsoft.com/office/infopath/2007/PartnerControls"/>
+    <ds:schemaRef ds:uri="http://schemas.openxmlformats.org/package/2006/metadata/core-properties"/>
+    <ds:schemaRef ds:uri="http://purl.org/dc/elements/1.1/"/>
+    <ds:schemaRef ds:uri="bbcd8c33-6940-4d4c-a587-bbc736ca1e4d"/>
+    <ds:schemaRef ds:uri="http://schemas.microsoft.com/office/2006/documentManagement/types"/>
+    <ds:schemaRef ds:uri="4327b14a-fe89-488e-9f6d-9658cacf372b"/>
+    <ds:schemaRef ds:uri="http://schemas.microsoft.com/office/2006/metadata/properties"/>
+    <ds:schemaRef ds:uri="http://www.w3.org/XML/1998/namespace"/>
+  </ds:schemaRefs>
+</ds:datastoreItem>
+</file>
+
+<file path=customXml/itemProps2.xml><?xml version="1.0" encoding="utf-8"?>
 <ds:datastoreItem xmlns:ds="http://schemas.openxmlformats.org/officeDocument/2006/customXml" ds:itemID="{6DE4A8B5-68AC-4B03-B2A1-E04BE1806673}">
   <ds:schemaRefs>
     <ds:schemaRef ds:uri="http://schemas.microsoft.com/office/2006/metadata/contentType"/>
@@ -19371,23 +19604,6 @@
 </ds:datastoreItem>
 </file>
 
-<file path=customXml/itemProps2.xml><?xml version="1.0" encoding="utf-8"?>
-<ds:datastoreItem xmlns:ds="http://schemas.openxmlformats.org/officeDocument/2006/customXml" ds:itemID="{08323129-B204-40D5-AFF8-9C9A9BF3922E}">
-  <ds:schemaRefs>
-    <ds:schemaRef ds:uri="http://purl.org/dc/terms/"/>
-    <ds:schemaRef ds:uri="http://purl.org/dc/dcmitype/"/>
-    <ds:schemaRef ds:uri="http://schemas.microsoft.com/office/infopath/2007/PartnerControls"/>
-    <ds:schemaRef ds:uri="http://schemas.openxmlformats.org/package/2006/metadata/core-properties"/>
-    <ds:schemaRef ds:uri="http://purl.org/dc/elements/1.1/"/>
-    <ds:schemaRef ds:uri="bbcd8c33-6940-4d4c-a587-bbc736ca1e4d"/>
-    <ds:schemaRef ds:uri="http://schemas.microsoft.com/office/2006/documentManagement/types"/>
-    <ds:schemaRef ds:uri="4327b14a-fe89-488e-9f6d-9658cacf372b"/>
-    <ds:schemaRef ds:uri="http://schemas.microsoft.com/office/2006/metadata/properties"/>
-    <ds:schemaRef ds:uri="http://www.w3.org/XML/1998/namespace"/>
-  </ds:schemaRefs>
-</ds:datastoreItem>
-</file>
-
 <file path=customXml/itemProps3.xml><?xml version="1.0" encoding="utf-8"?>
 <ds:datastoreItem xmlns:ds="http://schemas.openxmlformats.org/officeDocument/2006/customXml" ds:itemID="{C5C26249-539D-4496-936B-3CD83A43905E}">
   <ds:schemaRefs>

</xml_diff>